<commit_message>
Updated final presentation deck
</commit_message>
<xml_diff>
--- a/Final Presenation/CS_633_Zac3_term_project_report_FINAL_draft.pptx
+++ b/Final Presenation/CS_633_Zac3_term_project_report_FINAL_draft.pptx
@@ -11061,14 +11061,14 @@
           <a:effectLst/>
           <a:extLst>
             <a:ext uri="{909E8E84-426E-40dd-AFC4-6F175D3DCCD1}">
-              <a14:hiddenFill xmlns:a14="http://schemas.microsoft.com/office/drawing/2010/main" xmlns="">
+              <a14:hiddenFill xmlns="" xmlns:a14="http://schemas.microsoft.com/office/drawing/2010/main">
                 <a:solidFill>
                   <a:schemeClr val="accent1"/>
                 </a:solidFill>
               </a14:hiddenFill>
             </a:ext>
             <a:ext uri="{91240B29-F687-4f45-9708-019B960494DF}">
-              <a14:hiddenLine xmlns:a14="http://schemas.microsoft.com/office/drawing/2010/main" xmlns="" w="9525">
+              <a14:hiddenLine xmlns="" xmlns:a14="http://schemas.microsoft.com/office/drawing/2010/main" w="9525">
                 <a:solidFill>
                   <a:schemeClr val="tx1"/>
                 </a:solidFill>
@@ -11078,7 +11078,7 @@
               </a14:hiddenLine>
             </a:ext>
             <a:ext uri="{AF507438-7753-43e0-B8FC-AC1667EBCBE1}">
-              <a14:hiddenEffects xmlns:a14="http://schemas.microsoft.com/office/drawing/2010/main" xmlns="">
+              <a14:hiddenEffects xmlns="" xmlns:a14="http://schemas.microsoft.com/office/drawing/2010/main">
                 <a:effectLst>
                   <a:outerShdw dist="35921" dir="2700000" algn="ctr" rotWithShape="0">
                     <a:schemeClr val="bg2"/>
@@ -11212,14 +11212,14 @@
           <a:effectLst/>
           <a:extLst>
             <a:ext uri="{909E8E84-426E-40dd-AFC4-6F175D3DCCD1}">
-              <a14:hiddenFill xmlns:a14="http://schemas.microsoft.com/office/drawing/2010/main" xmlns="">
+              <a14:hiddenFill xmlns="" xmlns:a14="http://schemas.microsoft.com/office/drawing/2010/main">
                 <a:solidFill>
                   <a:schemeClr val="accent1"/>
                 </a:solidFill>
               </a14:hiddenFill>
             </a:ext>
             <a:ext uri="{91240B29-F687-4f45-9708-019B960494DF}">
-              <a14:hiddenLine xmlns:a14="http://schemas.microsoft.com/office/drawing/2010/main" xmlns="" w="9525">
+              <a14:hiddenLine xmlns="" xmlns:a14="http://schemas.microsoft.com/office/drawing/2010/main" w="9525">
                 <a:solidFill>
                   <a:schemeClr val="tx1"/>
                 </a:solidFill>
@@ -11229,7 +11229,7 @@
               </a14:hiddenLine>
             </a:ext>
             <a:ext uri="{AF507438-7753-43e0-B8FC-AC1667EBCBE1}">
-              <a14:hiddenEffects xmlns:a14="http://schemas.microsoft.com/office/drawing/2010/main" xmlns="">
+              <a14:hiddenEffects xmlns="" xmlns:a14="http://schemas.microsoft.com/office/drawing/2010/main">
                 <a:effectLst>
                   <a:outerShdw dist="35921" dir="2700000" algn="ctr" rotWithShape="0">
                     <a:schemeClr val="bg2"/>
@@ -16226,7 +16226,7 @@
           <a:p>
             <a:r>
               <a:rPr lang="en-US" dirty="0"/>
-              <a:t>Test Cases – Log In (NEG)</a:t>
+              <a:t>Test Cases – Log In (POS)</a:t>
             </a:r>
           </a:p>
         </p:txBody>
@@ -16483,31 +16483,1892 @@
           </a:p>
         </p:txBody>
       </p:sp>
-      <p:sp>
-        <p:nvSpPr>
-          <p:cNvPr id="3" name="Content Placeholder 2">
+      <p:graphicFrame>
+        <p:nvGraphicFramePr>
+          <p:cNvPr id="6" name="Content Placeholder 5">
             <a:extLst>
               <a:ext uri="{FF2B5EF4-FFF2-40B4-BE49-F238E27FC236}">
-                <a16:creationId xmlns:a16="http://schemas.microsoft.com/office/drawing/2014/main" id="{AD8308D9-AFFE-AF4F-A177-404443BE4CD6}"/>
+                <a16:creationId xmlns:a16="http://schemas.microsoft.com/office/drawing/2014/main" id="{60FC6571-5DB1-454E-A97B-E7AA73213013}"/>
               </a:ext>
             </a:extLst>
           </p:cNvPr>
-          <p:cNvSpPr>
-            <a:spLocks noGrp="1"/>
-          </p:cNvSpPr>
+          <p:cNvGraphicFramePr>
+            <a:graphicFrameLocks noGrp="1"/>
+          </p:cNvGraphicFramePr>
           <p:nvPr>
             <p:ph sz="quarter" idx="1"/>
+            <p:extLst>
+              <p:ext uri="{D42A27DB-BD31-4B8C-83A1-F6EECF244321}">
+                <p14:modId xmlns:p14="http://schemas.microsoft.com/office/powerpoint/2010/main" val="299267239"/>
+              </p:ext>
+            </p:extLst>
           </p:nvPr>
-        </p:nvSpPr>
-        <p:spPr/>
-        <p:txBody>
-          <a:bodyPr/>
-          <a:lstStyle/>
-          <a:p>
-            <a:endParaRPr lang="en-US"/>
-          </a:p>
-        </p:txBody>
-      </p:sp>
+        </p:nvGraphicFramePr>
+        <p:xfrm>
+          <a:off x="1857375" y="1416963"/>
+          <a:ext cx="4851400" cy="3072033"/>
+        </p:xfrm>
+        <a:graphic>
+          <a:graphicData uri="http://schemas.openxmlformats.org/drawingml/2006/table">
+            <a:tbl>
+              <a:tblPr>
+                <a:tableStyleId>{B301B821-A1FF-4177-AEE7-76D212191A09}</a:tableStyleId>
+              </a:tblPr>
+              <a:tblGrid>
+                <a:gridCol w="774700">
+                  <a:extLst>
+                    <a:ext uri="{9D8B030D-6E8A-4147-A177-3AD203B41FA5}">
+                      <a16:colId xmlns:a16="http://schemas.microsoft.com/office/drawing/2014/main" val="345757521"/>
+                    </a:ext>
+                  </a:extLst>
+                </a:gridCol>
+                <a:gridCol w="1019175">
+                  <a:extLst>
+                    <a:ext uri="{9D8B030D-6E8A-4147-A177-3AD203B41FA5}">
+                      <a16:colId xmlns:a16="http://schemas.microsoft.com/office/drawing/2014/main" val="443652253"/>
+                    </a:ext>
+                  </a:extLst>
+                </a:gridCol>
+                <a:gridCol w="1019175">
+                  <a:extLst>
+                    <a:ext uri="{9D8B030D-6E8A-4147-A177-3AD203B41FA5}">
+                      <a16:colId xmlns:a16="http://schemas.microsoft.com/office/drawing/2014/main" val="2251815030"/>
+                    </a:ext>
+                  </a:extLst>
+                </a:gridCol>
+                <a:gridCol w="1019175">
+                  <a:extLst>
+                    <a:ext uri="{9D8B030D-6E8A-4147-A177-3AD203B41FA5}">
+                      <a16:colId xmlns:a16="http://schemas.microsoft.com/office/drawing/2014/main" val="4152837818"/>
+                    </a:ext>
+                  </a:extLst>
+                </a:gridCol>
+                <a:gridCol w="1019175">
+                  <a:extLst>
+                    <a:ext uri="{9D8B030D-6E8A-4147-A177-3AD203B41FA5}">
+                      <a16:colId xmlns:a16="http://schemas.microsoft.com/office/drawing/2014/main" val="2245834379"/>
+                    </a:ext>
+                  </a:extLst>
+                </a:gridCol>
+              </a:tblGrid>
+              <a:tr h="219982">
+                <a:tc>
+                  <a:txBody>
+                    <a:bodyPr/>
+                    <a:lstStyle/>
+                    <a:p>
+                      <a:pPr algn="l" fontAlgn="b"/>
+                      <a:r>
+                        <a:rPr lang="en-US" sz="1200" u="none" strike="noStrike">
+                          <a:effectLst/>
+                        </a:rPr>
+                        <a:t>TEST CASES</a:t>
+                      </a:r>
+                      <a:endParaRPr lang="en-US" sz="1200" b="0" i="0" u="none" strike="noStrike">
+                        <a:solidFill>
+                          <a:srgbClr val="000000"/>
+                        </a:solidFill>
+                        <a:effectLst/>
+                        <a:latin typeface="Calibri" panose="020F0502020204030204" pitchFamily="34" charset="0"/>
+                      </a:endParaRPr>
+                    </a:p>
+                  </a:txBody>
+                  <a:tcPr marL="9525" marR="9525" marT="9525" marB="0" anchor="b"/>
+                </a:tc>
+                <a:tc>
+                  <a:txBody>
+                    <a:bodyPr/>
+                    <a:lstStyle/>
+                    <a:p>
+                      <a:pPr algn="l" fontAlgn="b"/>
+                      <a:endParaRPr lang="en-US" sz="1200" b="0" i="0" u="none" strike="noStrike">
+                        <a:solidFill>
+                          <a:srgbClr val="000000"/>
+                        </a:solidFill>
+                        <a:effectLst/>
+                        <a:latin typeface="Calibri" panose="020F0502020204030204" pitchFamily="34" charset="0"/>
+                      </a:endParaRPr>
+                    </a:p>
+                  </a:txBody>
+                  <a:tcPr marL="9525" marR="9525" marT="9525" marB="0" anchor="b"/>
+                </a:tc>
+                <a:tc>
+                  <a:txBody>
+                    <a:bodyPr/>
+                    <a:lstStyle/>
+                    <a:p>
+                      <a:pPr algn="l" fontAlgn="b"/>
+                      <a:endParaRPr lang="en-US" sz="1200" b="0" i="0" u="none" strike="noStrike">
+                        <a:solidFill>
+                          <a:srgbClr val="000000"/>
+                        </a:solidFill>
+                        <a:effectLst/>
+                        <a:latin typeface="Calibri" panose="020F0502020204030204" pitchFamily="34" charset="0"/>
+                      </a:endParaRPr>
+                    </a:p>
+                  </a:txBody>
+                  <a:tcPr marL="9525" marR="9525" marT="9525" marB="0" anchor="b"/>
+                </a:tc>
+                <a:tc>
+                  <a:txBody>
+                    <a:bodyPr/>
+                    <a:lstStyle/>
+                    <a:p>
+                      <a:pPr algn="l" fontAlgn="b"/>
+                      <a:endParaRPr lang="en-US" sz="1200" b="0" i="0" u="none" strike="noStrike">
+                        <a:solidFill>
+                          <a:srgbClr val="000000"/>
+                        </a:solidFill>
+                        <a:effectLst/>
+                        <a:latin typeface="Calibri" panose="020F0502020204030204" pitchFamily="34" charset="0"/>
+                      </a:endParaRPr>
+                    </a:p>
+                  </a:txBody>
+                  <a:tcPr marL="9525" marR="9525" marT="9525" marB="0" anchor="b"/>
+                </a:tc>
+                <a:tc>
+                  <a:txBody>
+                    <a:bodyPr/>
+                    <a:lstStyle/>
+                    <a:p>
+                      <a:pPr algn="l" fontAlgn="b"/>
+                      <a:endParaRPr lang="en-US" sz="1200" b="0" i="0" u="none" strike="noStrike">
+                        <a:solidFill>
+                          <a:srgbClr val="000000"/>
+                        </a:solidFill>
+                        <a:effectLst/>
+                        <a:latin typeface="Calibri" panose="020F0502020204030204" pitchFamily="34" charset="0"/>
+                      </a:endParaRPr>
+                    </a:p>
+                  </a:txBody>
+                  <a:tcPr marL="9525" marR="9525" marT="9525" marB="0" anchor="b"/>
+                </a:tc>
+                <a:extLst>
+                  <a:ext uri="{0D108BD9-81ED-4DB2-BD59-A6C34878D82A}">
+                    <a16:rowId xmlns:a16="http://schemas.microsoft.com/office/drawing/2014/main" val="3717305652"/>
+                  </a:ext>
+                </a:extLst>
+              </a:tr>
+              <a:tr h="219982">
+                <a:tc>
+                  <a:txBody>
+                    <a:bodyPr/>
+                    <a:lstStyle/>
+                    <a:p>
+                      <a:pPr algn="l" fontAlgn="b"/>
+                      <a:r>
+                        <a:rPr lang="en-US" sz="1200" u="none" strike="noStrike">
+                          <a:effectLst/>
+                        </a:rPr>
+                        <a:t>case</a:t>
+                      </a:r>
+                      <a:endParaRPr lang="en-US" sz="1200" b="0" i="0" u="none" strike="noStrike">
+                        <a:solidFill>
+                          <a:srgbClr val="000000"/>
+                        </a:solidFill>
+                        <a:effectLst/>
+                        <a:latin typeface="Calibri" panose="020F0502020204030204" pitchFamily="34" charset="0"/>
+                      </a:endParaRPr>
+                    </a:p>
+                  </a:txBody>
+                  <a:tcPr marL="9525" marR="9525" marT="9525" marB="0" anchor="b"/>
+                </a:tc>
+                <a:tc>
+                  <a:txBody>
+                    <a:bodyPr/>
+                    <a:lstStyle/>
+                    <a:p>
+                      <a:pPr algn="l" fontAlgn="b"/>
+                      <a:r>
+                        <a:rPr lang="en-US" sz="1200" u="none" strike="noStrike">
+                          <a:effectLst/>
+                        </a:rPr>
+                        <a:t>Function</a:t>
+                      </a:r>
+                      <a:endParaRPr lang="en-US" sz="1200" b="0" i="0" u="none" strike="noStrike">
+                        <a:solidFill>
+                          <a:srgbClr val="000000"/>
+                        </a:solidFill>
+                        <a:effectLst/>
+                        <a:latin typeface="Calibri" panose="020F0502020204030204" pitchFamily="34" charset="0"/>
+                      </a:endParaRPr>
+                    </a:p>
+                  </a:txBody>
+                  <a:tcPr marL="9525" marR="9525" marT="9525" marB="0" anchor="b"/>
+                </a:tc>
+                <a:tc>
+                  <a:txBody>
+                    <a:bodyPr/>
+                    <a:lstStyle/>
+                    <a:p>
+                      <a:pPr algn="l" fontAlgn="b"/>
+                      <a:r>
+                        <a:rPr lang="en-US" sz="1200" u="none" strike="noStrike">
+                          <a:effectLst/>
+                        </a:rPr>
+                        <a:t>user</a:t>
+                      </a:r>
+                      <a:endParaRPr lang="en-US" sz="1200" b="0" i="0" u="none" strike="noStrike">
+                        <a:solidFill>
+                          <a:srgbClr val="000000"/>
+                        </a:solidFill>
+                        <a:effectLst/>
+                        <a:latin typeface="Calibri" panose="020F0502020204030204" pitchFamily="34" charset="0"/>
+                      </a:endParaRPr>
+                    </a:p>
+                  </a:txBody>
+                  <a:tcPr marL="9525" marR="9525" marT="9525" marB="0" anchor="b"/>
+                </a:tc>
+                <a:tc>
+                  <a:txBody>
+                    <a:bodyPr/>
+                    <a:lstStyle/>
+                    <a:p>
+                      <a:pPr algn="l" fontAlgn="b"/>
+                      <a:r>
+                        <a:rPr lang="en-US" sz="1200" u="none" strike="noStrike">
+                          <a:effectLst/>
+                        </a:rPr>
+                        <a:t>source</a:t>
+                      </a:r>
+                      <a:endParaRPr lang="en-US" sz="1200" b="0" i="0" u="none" strike="noStrike">
+                        <a:solidFill>
+                          <a:srgbClr val="000000"/>
+                        </a:solidFill>
+                        <a:effectLst/>
+                        <a:latin typeface="Calibri" panose="020F0502020204030204" pitchFamily="34" charset="0"/>
+                      </a:endParaRPr>
+                    </a:p>
+                  </a:txBody>
+                  <a:tcPr marL="9525" marR="9525" marT="9525" marB="0" anchor="b"/>
+                </a:tc>
+                <a:tc>
+                  <a:txBody>
+                    <a:bodyPr/>
+                    <a:lstStyle/>
+                    <a:p>
+                      <a:pPr algn="l" fontAlgn="b"/>
+                      <a:r>
+                        <a:rPr lang="en-US" sz="1200" u="none" strike="noStrike">
+                          <a:effectLst/>
+                        </a:rPr>
+                        <a:t>pairings</a:t>
+                      </a:r>
+                      <a:endParaRPr lang="en-US" sz="1200" b="0" i="0" u="none" strike="noStrike">
+                        <a:solidFill>
+                          <a:srgbClr val="000000"/>
+                        </a:solidFill>
+                        <a:effectLst/>
+                        <a:latin typeface="Calibri" panose="020F0502020204030204" pitchFamily="34" charset="0"/>
+                      </a:endParaRPr>
+                    </a:p>
+                  </a:txBody>
+                  <a:tcPr marL="9525" marR="9525" marT="9525" marB="0" anchor="b"/>
+                </a:tc>
+                <a:extLst>
+                  <a:ext uri="{0D108BD9-81ED-4DB2-BD59-A6C34878D82A}">
+                    <a16:rowId xmlns:a16="http://schemas.microsoft.com/office/drawing/2014/main" val="2723526602"/>
+                  </a:ext>
+                </a:extLst>
+              </a:tr>
+              <a:tr h="219982">
+                <a:tc>
+                  <a:txBody>
+                    <a:bodyPr/>
+                    <a:lstStyle/>
+                    <a:p>
+                      <a:pPr algn="r" fontAlgn="b"/>
+                      <a:r>
+                        <a:rPr lang="en-US" sz="1200" u="none" strike="noStrike">
+                          <a:effectLst/>
+                        </a:rPr>
+                        <a:t>1</a:t>
+                      </a:r>
+                      <a:endParaRPr lang="en-US" sz="1200" b="0" i="0" u="none" strike="noStrike">
+                        <a:solidFill>
+                          <a:srgbClr val="000000"/>
+                        </a:solidFill>
+                        <a:effectLst/>
+                        <a:latin typeface="Calibri" panose="020F0502020204030204" pitchFamily="34" charset="0"/>
+                      </a:endParaRPr>
+                    </a:p>
+                  </a:txBody>
+                  <a:tcPr marL="9525" marR="9525" marT="9525" marB="0" anchor="b"/>
+                </a:tc>
+                <a:tc>
+                  <a:txBody>
+                    <a:bodyPr/>
+                    <a:lstStyle/>
+                    <a:p>
+                      <a:pPr algn="l" fontAlgn="b"/>
+                      <a:r>
+                        <a:rPr lang="en-US" sz="1200" u="none" strike="noStrike">
+                          <a:effectLst/>
+                        </a:rPr>
+                        <a:t>Register</a:t>
+                      </a:r>
+                      <a:endParaRPr lang="en-US" sz="1200" b="0" i="0" u="none" strike="noStrike">
+                        <a:solidFill>
+                          <a:srgbClr val="000000"/>
+                        </a:solidFill>
+                        <a:effectLst/>
+                        <a:latin typeface="Calibri" panose="020F0502020204030204" pitchFamily="34" charset="0"/>
+                      </a:endParaRPr>
+                    </a:p>
+                  </a:txBody>
+                  <a:tcPr marL="9525" marR="9525" marT="9525" marB="0" anchor="b"/>
+                </a:tc>
+                <a:tc>
+                  <a:txBody>
+                    <a:bodyPr/>
+                    <a:lstStyle/>
+                    <a:p>
+                      <a:pPr algn="l" fontAlgn="b"/>
+                      <a:r>
+                        <a:rPr lang="en-US" sz="1200" u="none" strike="noStrike" dirty="0">
+                          <a:effectLst/>
+                        </a:rPr>
+                        <a:t>trainer</a:t>
+                      </a:r>
+                      <a:endParaRPr lang="en-US" sz="1200" b="0" i="0" u="none" strike="noStrike" dirty="0">
+                        <a:solidFill>
+                          <a:srgbClr val="000000"/>
+                        </a:solidFill>
+                        <a:effectLst/>
+                        <a:latin typeface="Calibri" panose="020F0502020204030204" pitchFamily="34" charset="0"/>
+                      </a:endParaRPr>
+                    </a:p>
+                  </a:txBody>
+                  <a:tcPr marL="9525" marR="9525" marT="9525" marB="0" anchor="b"/>
+                </a:tc>
+                <a:tc>
+                  <a:txBody>
+                    <a:bodyPr/>
+                    <a:lstStyle/>
+                    <a:p>
+                      <a:pPr algn="l" fontAlgn="b"/>
+                      <a:r>
+                        <a:rPr lang="en-US" sz="1200" u="none" strike="noStrike">
+                          <a:effectLst/>
+                        </a:rPr>
+                        <a:t>internal</a:t>
+                      </a:r>
+                      <a:endParaRPr lang="en-US" sz="1200" b="0" i="0" u="none" strike="noStrike">
+                        <a:solidFill>
+                          <a:srgbClr val="000000"/>
+                        </a:solidFill>
+                        <a:effectLst/>
+                        <a:latin typeface="Calibri" panose="020F0502020204030204" pitchFamily="34" charset="0"/>
+                      </a:endParaRPr>
+                    </a:p>
+                  </a:txBody>
+                  <a:tcPr marL="9525" marR="9525" marT="9525" marB="0" anchor="b"/>
+                </a:tc>
+                <a:tc>
+                  <a:txBody>
+                    <a:bodyPr/>
+                    <a:lstStyle/>
+                    <a:p>
+                      <a:pPr algn="r" fontAlgn="b"/>
+                      <a:r>
+                        <a:rPr lang="en-US" sz="1200" u="none" strike="noStrike">
+                          <a:effectLst/>
+                        </a:rPr>
+                        <a:t>3</a:t>
+                      </a:r>
+                      <a:endParaRPr lang="en-US" sz="1200" b="0" i="0" u="none" strike="noStrike">
+                        <a:solidFill>
+                          <a:srgbClr val="000000"/>
+                        </a:solidFill>
+                        <a:effectLst/>
+                        <a:latin typeface="Calibri" panose="020F0502020204030204" pitchFamily="34" charset="0"/>
+                      </a:endParaRPr>
+                    </a:p>
+                  </a:txBody>
+                  <a:tcPr marL="9525" marR="9525" marT="9525" marB="0" anchor="b"/>
+                </a:tc>
+                <a:extLst>
+                  <a:ext uri="{0D108BD9-81ED-4DB2-BD59-A6C34878D82A}">
+                    <a16:rowId xmlns:a16="http://schemas.microsoft.com/office/drawing/2014/main" val="1195390739"/>
+                  </a:ext>
+                </a:extLst>
+              </a:tr>
+              <a:tr h="219982">
+                <a:tc>
+                  <a:txBody>
+                    <a:bodyPr/>
+                    <a:lstStyle/>
+                    <a:p>
+                      <a:pPr algn="r" fontAlgn="b"/>
+                      <a:r>
+                        <a:rPr lang="en-US" sz="1200" u="none" strike="noStrike" dirty="0">
+                          <a:effectLst/>
+                        </a:rPr>
+                        <a:t>2</a:t>
+                      </a:r>
+                      <a:endParaRPr lang="en-US" sz="1200" b="0" i="0" u="none" strike="noStrike" dirty="0">
+                        <a:solidFill>
+                          <a:srgbClr val="000000"/>
+                        </a:solidFill>
+                        <a:effectLst/>
+                        <a:latin typeface="Calibri" panose="020F0502020204030204" pitchFamily="34" charset="0"/>
+                      </a:endParaRPr>
+                    </a:p>
+                  </a:txBody>
+                  <a:tcPr marL="9525" marR="9525" marT="9525" marB="0" anchor="b">
+                    <a:solidFill>
+                      <a:srgbClr val="FFFF00"/>
+                    </a:solidFill>
+                  </a:tcPr>
+                </a:tc>
+                <a:tc>
+                  <a:txBody>
+                    <a:bodyPr/>
+                    <a:lstStyle/>
+                    <a:p>
+                      <a:pPr algn="l" fontAlgn="b"/>
+                      <a:r>
+                        <a:rPr lang="en-US" sz="1200" u="none" strike="noStrike" dirty="0">
+                          <a:effectLst/>
+                        </a:rPr>
+                        <a:t>Register</a:t>
+                      </a:r>
+                      <a:endParaRPr lang="en-US" sz="1200" b="0" i="0" u="none" strike="noStrike" dirty="0">
+                        <a:solidFill>
+                          <a:srgbClr val="000000"/>
+                        </a:solidFill>
+                        <a:effectLst/>
+                        <a:latin typeface="Calibri" panose="020F0502020204030204" pitchFamily="34" charset="0"/>
+                      </a:endParaRPr>
+                    </a:p>
+                  </a:txBody>
+                  <a:tcPr marL="9525" marR="9525" marT="9525" marB="0" anchor="b">
+                    <a:solidFill>
+                      <a:srgbClr val="FFFF00"/>
+                    </a:solidFill>
+                  </a:tcPr>
+                </a:tc>
+                <a:tc>
+                  <a:txBody>
+                    <a:bodyPr/>
+                    <a:lstStyle/>
+                    <a:p>
+                      <a:pPr algn="l" fontAlgn="b"/>
+                      <a:r>
+                        <a:rPr lang="en-US" sz="1200" u="none" strike="noStrike" dirty="0">
+                          <a:effectLst/>
+                        </a:rPr>
+                        <a:t>customer</a:t>
+                      </a:r>
+                      <a:endParaRPr lang="en-US" sz="1200" b="0" i="0" u="none" strike="noStrike" dirty="0">
+                        <a:solidFill>
+                          <a:srgbClr val="000000"/>
+                        </a:solidFill>
+                        <a:effectLst/>
+                        <a:latin typeface="Calibri" panose="020F0502020204030204" pitchFamily="34" charset="0"/>
+                      </a:endParaRPr>
+                    </a:p>
+                  </a:txBody>
+                  <a:tcPr marL="9525" marR="9525" marT="9525" marB="0" anchor="b">
+                    <a:solidFill>
+                      <a:srgbClr val="FFFF00"/>
+                    </a:solidFill>
+                  </a:tcPr>
+                </a:tc>
+                <a:tc>
+                  <a:txBody>
+                    <a:bodyPr/>
+                    <a:lstStyle/>
+                    <a:p>
+                      <a:pPr algn="l" fontAlgn="b"/>
+                      <a:r>
+                        <a:rPr lang="en-US" sz="1200" u="none" strike="noStrike" dirty="0">
+                          <a:effectLst/>
+                        </a:rPr>
+                        <a:t>external</a:t>
+                      </a:r>
+                      <a:endParaRPr lang="en-US" sz="1200" b="0" i="0" u="none" strike="noStrike" dirty="0">
+                        <a:solidFill>
+                          <a:srgbClr val="000000"/>
+                        </a:solidFill>
+                        <a:effectLst/>
+                        <a:latin typeface="Calibri" panose="020F0502020204030204" pitchFamily="34" charset="0"/>
+                      </a:endParaRPr>
+                    </a:p>
+                  </a:txBody>
+                  <a:tcPr marL="9525" marR="9525" marT="9525" marB="0" anchor="b">
+                    <a:solidFill>
+                      <a:srgbClr val="FFFF00"/>
+                    </a:solidFill>
+                  </a:tcPr>
+                </a:tc>
+                <a:tc>
+                  <a:txBody>
+                    <a:bodyPr/>
+                    <a:lstStyle/>
+                    <a:p>
+                      <a:pPr algn="r" fontAlgn="b"/>
+                      <a:r>
+                        <a:rPr lang="en-US" sz="1200" u="none" strike="noStrike" dirty="0">
+                          <a:effectLst/>
+                        </a:rPr>
+                        <a:t>3</a:t>
+                      </a:r>
+                      <a:endParaRPr lang="en-US" sz="1200" b="0" i="0" u="none" strike="noStrike" dirty="0">
+                        <a:solidFill>
+                          <a:srgbClr val="000000"/>
+                        </a:solidFill>
+                        <a:effectLst/>
+                        <a:latin typeface="Calibri" panose="020F0502020204030204" pitchFamily="34" charset="0"/>
+                      </a:endParaRPr>
+                    </a:p>
+                  </a:txBody>
+                  <a:tcPr marL="9525" marR="9525" marT="9525" marB="0" anchor="b">
+                    <a:solidFill>
+                      <a:srgbClr val="FFFF00"/>
+                    </a:solidFill>
+                  </a:tcPr>
+                </a:tc>
+                <a:extLst>
+                  <a:ext uri="{0D108BD9-81ED-4DB2-BD59-A6C34878D82A}">
+                    <a16:rowId xmlns:a16="http://schemas.microsoft.com/office/drawing/2014/main" val="89442531"/>
+                  </a:ext>
+                </a:extLst>
+              </a:tr>
+              <a:tr h="219982">
+                <a:tc>
+                  <a:txBody>
+                    <a:bodyPr/>
+                    <a:lstStyle/>
+                    <a:p>
+                      <a:pPr algn="r" fontAlgn="b"/>
+                      <a:r>
+                        <a:rPr lang="en-US" sz="1200" u="none" strike="noStrike">
+                          <a:effectLst/>
+                        </a:rPr>
+                        <a:t>3</a:t>
+                      </a:r>
+                      <a:endParaRPr lang="en-US" sz="1200" b="0" i="0" u="none" strike="noStrike">
+                        <a:solidFill>
+                          <a:srgbClr val="000000"/>
+                        </a:solidFill>
+                        <a:effectLst/>
+                        <a:latin typeface="Calibri" panose="020F0502020204030204" pitchFamily="34" charset="0"/>
+                      </a:endParaRPr>
+                    </a:p>
+                  </a:txBody>
+                  <a:tcPr marL="9525" marR="9525" marT="9525" marB="0" anchor="b"/>
+                </a:tc>
+                <a:tc>
+                  <a:txBody>
+                    <a:bodyPr/>
+                    <a:lstStyle/>
+                    <a:p>
+                      <a:pPr algn="l" fontAlgn="b"/>
+                      <a:r>
+                        <a:rPr lang="en-US" sz="1200" u="none" strike="noStrike">
+                          <a:effectLst/>
+                        </a:rPr>
+                        <a:t>Log-in</a:t>
+                      </a:r>
+                      <a:endParaRPr lang="en-US" sz="1200" b="0" i="0" u="none" strike="noStrike">
+                        <a:solidFill>
+                          <a:srgbClr val="000000"/>
+                        </a:solidFill>
+                        <a:effectLst/>
+                        <a:latin typeface="Calibri" panose="020F0502020204030204" pitchFamily="34" charset="0"/>
+                      </a:endParaRPr>
+                    </a:p>
+                  </a:txBody>
+                  <a:tcPr marL="9525" marR="9525" marT="9525" marB="0" anchor="b"/>
+                </a:tc>
+                <a:tc>
+                  <a:txBody>
+                    <a:bodyPr/>
+                    <a:lstStyle/>
+                    <a:p>
+                      <a:pPr algn="l" fontAlgn="b"/>
+                      <a:r>
+                        <a:rPr lang="en-US" sz="1200" u="none" strike="noStrike" dirty="0">
+                          <a:effectLst/>
+                        </a:rPr>
+                        <a:t>trainer</a:t>
+                      </a:r>
+                      <a:endParaRPr lang="en-US" sz="1200" b="0" i="0" u="none" strike="noStrike" dirty="0">
+                        <a:solidFill>
+                          <a:srgbClr val="000000"/>
+                        </a:solidFill>
+                        <a:effectLst/>
+                        <a:latin typeface="Calibri" panose="020F0502020204030204" pitchFamily="34" charset="0"/>
+                      </a:endParaRPr>
+                    </a:p>
+                  </a:txBody>
+                  <a:tcPr marL="9525" marR="9525" marT="9525" marB="0" anchor="b"/>
+                </a:tc>
+                <a:tc>
+                  <a:txBody>
+                    <a:bodyPr/>
+                    <a:lstStyle/>
+                    <a:p>
+                      <a:pPr algn="l" fontAlgn="b"/>
+                      <a:r>
+                        <a:rPr lang="en-US" sz="1200" u="none" strike="noStrike" dirty="0">
+                          <a:effectLst/>
+                        </a:rPr>
+                        <a:t>external</a:t>
+                      </a:r>
+                      <a:endParaRPr lang="en-US" sz="1200" b="0" i="0" u="none" strike="noStrike" dirty="0">
+                        <a:solidFill>
+                          <a:srgbClr val="000000"/>
+                        </a:solidFill>
+                        <a:effectLst/>
+                        <a:latin typeface="Calibri" panose="020F0502020204030204" pitchFamily="34" charset="0"/>
+                      </a:endParaRPr>
+                    </a:p>
+                  </a:txBody>
+                  <a:tcPr marL="9525" marR="9525" marT="9525" marB="0" anchor="b"/>
+                </a:tc>
+                <a:tc>
+                  <a:txBody>
+                    <a:bodyPr/>
+                    <a:lstStyle/>
+                    <a:p>
+                      <a:pPr algn="r" fontAlgn="b"/>
+                      <a:r>
+                        <a:rPr lang="en-US" sz="1200" u="none" strike="noStrike" dirty="0">
+                          <a:effectLst/>
+                        </a:rPr>
+                        <a:t>3</a:t>
+                      </a:r>
+                      <a:endParaRPr lang="en-US" sz="1200" b="0" i="0" u="none" strike="noStrike" dirty="0">
+                        <a:solidFill>
+                          <a:srgbClr val="000000"/>
+                        </a:solidFill>
+                        <a:effectLst/>
+                        <a:latin typeface="Calibri" panose="020F0502020204030204" pitchFamily="34" charset="0"/>
+                      </a:endParaRPr>
+                    </a:p>
+                  </a:txBody>
+                  <a:tcPr marL="9525" marR="9525" marT="9525" marB="0" anchor="b"/>
+                </a:tc>
+                <a:extLst>
+                  <a:ext uri="{0D108BD9-81ED-4DB2-BD59-A6C34878D82A}">
+                    <a16:rowId xmlns:a16="http://schemas.microsoft.com/office/drawing/2014/main" val="2061981329"/>
+                  </a:ext>
+                </a:extLst>
+              </a:tr>
+              <a:tr h="219982">
+                <a:tc>
+                  <a:txBody>
+                    <a:bodyPr/>
+                    <a:lstStyle/>
+                    <a:p>
+                      <a:pPr algn="r" fontAlgn="b"/>
+                      <a:r>
+                        <a:rPr lang="en-US" sz="1200" u="none" strike="noStrike" dirty="0">
+                          <a:effectLst/>
+                        </a:rPr>
+                        <a:t>4</a:t>
+                      </a:r>
+                      <a:endParaRPr lang="en-US" sz="1200" b="0" i="0" u="none" strike="noStrike" dirty="0">
+                        <a:solidFill>
+                          <a:srgbClr val="000000"/>
+                        </a:solidFill>
+                        <a:effectLst/>
+                        <a:latin typeface="Calibri" panose="020F0502020204030204" pitchFamily="34" charset="0"/>
+                      </a:endParaRPr>
+                    </a:p>
+                  </a:txBody>
+                  <a:tcPr marL="9525" marR="9525" marT="9525" marB="0" anchor="b">
+                    <a:solidFill>
+                      <a:srgbClr val="FFFF00"/>
+                    </a:solidFill>
+                  </a:tcPr>
+                </a:tc>
+                <a:tc>
+                  <a:txBody>
+                    <a:bodyPr/>
+                    <a:lstStyle/>
+                    <a:p>
+                      <a:pPr algn="l" fontAlgn="b"/>
+                      <a:r>
+                        <a:rPr lang="en-US" sz="1200" u="none" strike="noStrike" dirty="0">
+                          <a:effectLst/>
+                        </a:rPr>
+                        <a:t>Log-in</a:t>
+                      </a:r>
+                      <a:endParaRPr lang="en-US" sz="1200" b="0" i="0" u="none" strike="noStrike" dirty="0">
+                        <a:solidFill>
+                          <a:srgbClr val="000000"/>
+                        </a:solidFill>
+                        <a:effectLst/>
+                        <a:latin typeface="Calibri" panose="020F0502020204030204" pitchFamily="34" charset="0"/>
+                      </a:endParaRPr>
+                    </a:p>
+                  </a:txBody>
+                  <a:tcPr marL="9525" marR="9525" marT="9525" marB="0" anchor="b">
+                    <a:solidFill>
+                      <a:srgbClr val="FFFF00"/>
+                    </a:solidFill>
+                  </a:tcPr>
+                </a:tc>
+                <a:tc>
+                  <a:txBody>
+                    <a:bodyPr/>
+                    <a:lstStyle/>
+                    <a:p>
+                      <a:pPr algn="l" fontAlgn="b"/>
+                      <a:r>
+                        <a:rPr lang="en-US" sz="1200" u="none" strike="noStrike" dirty="0">
+                          <a:effectLst/>
+                        </a:rPr>
+                        <a:t>customer</a:t>
+                      </a:r>
+                      <a:endParaRPr lang="en-US" sz="1200" b="0" i="0" u="none" strike="noStrike" dirty="0">
+                        <a:solidFill>
+                          <a:srgbClr val="000000"/>
+                        </a:solidFill>
+                        <a:effectLst/>
+                        <a:latin typeface="Calibri" panose="020F0502020204030204" pitchFamily="34" charset="0"/>
+                      </a:endParaRPr>
+                    </a:p>
+                  </a:txBody>
+                  <a:tcPr marL="9525" marR="9525" marT="9525" marB="0" anchor="b">
+                    <a:solidFill>
+                      <a:srgbClr val="FFFF00"/>
+                    </a:solidFill>
+                  </a:tcPr>
+                </a:tc>
+                <a:tc>
+                  <a:txBody>
+                    <a:bodyPr/>
+                    <a:lstStyle/>
+                    <a:p>
+                      <a:pPr algn="l" fontAlgn="b"/>
+                      <a:r>
+                        <a:rPr lang="en-US" sz="1200" u="none" strike="noStrike" dirty="0">
+                          <a:effectLst/>
+                        </a:rPr>
+                        <a:t>internal</a:t>
+                      </a:r>
+                      <a:endParaRPr lang="en-US" sz="1200" b="0" i="0" u="none" strike="noStrike" dirty="0">
+                        <a:solidFill>
+                          <a:srgbClr val="000000"/>
+                        </a:solidFill>
+                        <a:effectLst/>
+                        <a:latin typeface="Calibri" panose="020F0502020204030204" pitchFamily="34" charset="0"/>
+                      </a:endParaRPr>
+                    </a:p>
+                  </a:txBody>
+                  <a:tcPr marL="9525" marR="9525" marT="9525" marB="0" anchor="b">
+                    <a:solidFill>
+                      <a:srgbClr val="FFFF00"/>
+                    </a:solidFill>
+                  </a:tcPr>
+                </a:tc>
+                <a:tc>
+                  <a:txBody>
+                    <a:bodyPr/>
+                    <a:lstStyle/>
+                    <a:p>
+                      <a:pPr algn="r" fontAlgn="b"/>
+                      <a:r>
+                        <a:rPr lang="en-US" sz="1200" u="none" strike="noStrike" dirty="0">
+                          <a:effectLst/>
+                        </a:rPr>
+                        <a:t>3</a:t>
+                      </a:r>
+                      <a:endParaRPr lang="en-US" sz="1200" b="0" i="0" u="none" strike="noStrike" dirty="0">
+                        <a:solidFill>
+                          <a:srgbClr val="000000"/>
+                        </a:solidFill>
+                        <a:effectLst/>
+                        <a:latin typeface="Calibri" panose="020F0502020204030204" pitchFamily="34" charset="0"/>
+                      </a:endParaRPr>
+                    </a:p>
+                  </a:txBody>
+                  <a:tcPr marL="9525" marR="9525" marT="9525" marB="0" anchor="b">
+                    <a:solidFill>
+                      <a:srgbClr val="FFFF00"/>
+                    </a:solidFill>
+                  </a:tcPr>
+                </a:tc>
+                <a:extLst>
+                  <a:ext uri="{0D108BD9-81ED-4DB2-BD59-A6C34878D82A}">
+                    <a16:rowId xmlns:a16="http://schemas.microsoft.com/office/drawing/2014/main" val="4207048923"/>
+                  </a:ext>
+                </a:extLst>
+              </a:tr>
+              <a:tr h="219982">
+                <a:tc>
+                  <a:txBody>
+                    <a:bodyPr/>
+                    <a:lstStyle/>
+                    <a:p>
+                      <a:pPr algn="r" fontAlgn="b"/>
+                      <a:r>
+                        <a:rPr lang="en-US" sz="1200" u="none" strike="noStrike">
+                          <a:effectLst/>
+                        </a:rPr>
+                        <a:t>5</a:t>
+                      </a:r>
+                      <a:endParaRPr lang="en-US" sz="1200" b="0" i="0" u="none" strike="noStrike">
+                        <a:solidFill>
+                          <a:srgbClr val="000000"/>
+                        </a:solidFill>
+                        <a:effectLst/>
+                        <a:latin typeface="Calibri" panose="020F0502020204030204" pitchFamily="34" charset="0"/>
+                      </a:endParaRPr>
+                    </a:p>
+                  </a:txBody>
+                  <a:tcPr marL="9525" marR="9525" marT="9525" marB="0" anchor="b"/>
+                </a:tc>
+                <a:tc>
+                  <a:txBody>
+                    <a:bodyPr/>
+                    <a:lstStyle/>
+                    <a:p>
+                      <a:pPr algn="l" fontAlgn="b"/>
+                      <a:r>
+                        <a:rPr lang="en-US" sz="1200" u="none" strike="noStrike" dirty="0">
+                          <a:effectLst/>
+                        </a:rPr>
+                        <a:t>Log meals</a:t>
+                      </a:r>
+                      <a:endParaRPr lang="en-US" sz="1200" b="0" i="0" u="none" strike="noStrike" dirty="0">
+                        <a:solidFill>
+                          <a:srgbClr val="000000"/>
+                        </a:solidFill>
+                        <a:effectLst/>
+                        <a:latin typeface="Calibri" panose="020F0502020204030204" pitchFamily="34" charset="0"/>
+                      </a:endParaRPr>
+                    </a:p>
+                  </a:txBody>
+                  <a:tcPr marL="9525" marR="9525" marT="9525" marB="0" anchor="b"/>
+                </a:tc>
+                <a:tc>
+                  <a:txBody>
+                    <a:bodyPr/>
+                    <a:lstStyle/>
+                    <a:p>
+                      <a:pPr algn="l" fontAlgn="b"/>
+                      <a:r>
+                        <a:rPr lang="en-US" sz="1200" u="none" strike="noStrike" dirty="0">
+                          <a:effectLst/>
+                        </a:rPr>
+                        <a:t>trainer</a:t>
+                      </a:r>
+                      <a:endParaRPr lang="en-US" sz="1200" b="0" i="0" u="none" strike="noStrike" dirty="0">
+                        <a:solidFill>
+                          <a:srgbClr val="000000"/>
+                        </a:solidFill>
+                        <a:effectLst/>
+                        <a:latin typeface="Calibri" panose="020F0502020204030204" pitchFamily="34" charset="0"/>
+                      </a:endParaRPr>
+                    </a:p>
+                  </a:txBody>
+                  <a:tcPr marL="9525" marR="9525" marT="9525" marB="0" anchor="b"/>
+                </a:tc>
+                <a:tc>
+                  <a:txBody>
+                    <a:bodyPr/>
+                    <a:lstStyle/>
+                    <a:p>
+                      <a:pPr algn="l" fontAlgn="b"/>
+                      <a:r>
+                        <a:rPr lang="en-US" sz="1200" u="none" strike="noStrike">
+                          <a:effectLst/>
+                        </a:rPr>
+                        <a:t>internal</a:t>
+                      </a:r>
+                      <a:endParaRPr lang="en-US" sz="1200" b="0" i="0" u="none" strike="noStrike">
+                        <a:solidFill>
+                          <a:srgbClr val="000000"/>
+                        </a:solidFill>
+                        <a:effectLst/>
+                        <a:latin typeface="Calibri" panose="020F0502020204030204" pitchFamily="34" charset="0"/>
+                      </a:endParaRPr>
+                    </a:p>
+                  </a:txBody>
+                  <a:tcPr marL="9525" marR="9525" marT="9525" marB="0" anchor="b"/>
+                </a:tc>
+                <a:tc>
+                  <a:txBody>
+                    <a:bodyPr/>
+                    <a:lstStyle/>
+                    <a:p>
+                      <a:pPr algn="r" fontAlgn="b"/>
+                      <a:r>
+                        <a:rPr lang="en-US" sz="1200" u="none" strike="noStrike" dirty="0">
+                          <a:effectLst/>
+                        </a:rPr>
+                        <a:t>2</a:t>
+                      </a:r>
+                      <a:endParaRPr lang="en-US" sz="1200" b="0" i="0" u="none" strike="noStrike" dirty="0">
+                        <a:solidFill>
+                          <a:srgbClr val="000000"/>
+                        </a:solidFill>
+                        <a:effectLst/>
+                        <a:latin typeface="Calibri" panose="020F0502020204030204" pitchFamily="34" charset="0"/>
+                      </a:endParaRPr>
+                    </a:p>
+                  </a:txBody>
+                  <a:tcPr marL="9525" marR="9525" marT="9525" marB="0" anchor="b"/>
+                </a:tc>
+                <a:extLst>
+                  <a:ext uri="{0D108BD9-81ED-4DB2-BD59-A6C34878D82A}">
+                    <a16:rowId xmlns:a16="http://schemas.microsoft.com/office/drawing/2014/main" val="2042227240"/>
+                  </a:ext>
+                </a:extLst>
+              </a:tr>
+              <a:tr h="219982">
+                <a:tc>
+                  <a:txBody>
+                    <a:bodyPr/>
+                    <a:lstStyle/>
+                    <a:p>
+                      <a:pPr algn="r" fontAlgn="b"/>
+                      <a:r>
+                        <a:rPr lang="en-US" sz="1200" u="none" strike="noStrike">
+                          <a:effectLst/>
+                        </a:rPr>
+                        <a:t>6</a:t>
+                      </a:r>
+                      <a:endParaRPr lang="en-US" sz="1200" b="0" i="0" u="none" strike="noStrike">
+                        <a:solidFill>
+                          <a:srgbClr val="000000"/>
+                        </a:solidFill>
+                        <a:effectLst/>
+                        <a:latin typeface="Calibri" panose="020F0502020204030204" pitchFamily="34" charset="0"/>
+                      </a:endParaRPr>
+                    </a:p>
+                  </a:txBody>
+                  <a:tcPr marL="9525" marR="9525" marT="9525" marB="0" anchor="b"/>
+                </a:tc>
+                <a:tc>
+                  <a:txBody>
+                    <a:bodyPr/>
+                    <a:lstStyle/>
+                    <a:p>
+                      <a:pPr algn="l" fontAlgn="b"/>
+                      <a:r>
+                        <a:rPr lang="en-US" sz="1200" u="none" strike="noStrike">
+                          <a:effectLst/>
+                        </a:rPr>
+                        <a:t>Log meals</a:t>
+                      </a:r>
+                      <a:endParaRPr lang="en-US" sz="1200" b="0" i="0" u="none" strike="noStrike">
+                        <a:solidFill>
+                          <a:srgbClr val="000000"/>
+                        </a:solidFill>
+                        <a:effectLst/>
+                        <a:latin typeface="Calibri" panose="020F0502020204030204" pitchFamily="34" charset="0"/>
+                      </a:endParaRPr>
+                    </a:p>
+                  </a:txBody>
+                  <a:tcPr marL="9525" marR="9525" marT="9525" marB="0" anchor="b"/>
+                </a:tc>
+                <a:tc>
+                  <a:txBody>
+                    <a:bodyPr/>
+                    <a:lstStyle/>
+                    <a:p>
+                      <a:pPr algn="l" fontAlgn="b"/>
+                      <a:r>
+                        <a:rPr lang="en-US" sz="1200" u="none" strike="noStrike">
+                          <a:effectLst/>
+                        </a:rPr>
+                        <a:t>customer</a:t>
+                      </a:r>
+                      <a:endParaRPr lang="en-US" sz="1200" b="0" i="0" u="none" strike="noStrike">
+                        <a:solidFill>
+                          <a:srgbClr val="000000"/>
+                        </a:solidFill>
+                        <a:effectLst/>
+                        <a:latin typeface="Calibri" panose="020F0502020204030204" pitchFamily="34" charset="0"/>
+                      </a:endParaRPr>
+                    </a:p>
+                  </a:txBody>
+                  <a:tcPr marL="9525" marR="9525" marT="9525" marB="0" anchor="b"/>
+                </a:tc>
+                <a:tc>
+                  <a:txBody>
+                    <a:bodyPr/>
+                    <a:lstStyle/>
+                    <a:p>
+                      <a:pPr algn="l" fontAlgn="b"/>
+                      <a:r>
+                        <a:rPr lang="en-US" sz="1200" u="none" strike="noStrike">
+                          <a:effectLst/>
+                        </a:rPr>
+                        <a:t>external</a:t>
+                      </a:r>
+                      <a:endParaRPr lang="en-US" sz="1200" b="0" i="0" u="none" strike="noStrike">
+                        <a:solidFill>
+                          <a:srgbClr val="000000"/>
+                        </a:solidFill>
+                        <a:effectLst/>
+                        <a:latin typeface="Calibri" panose="020F0502020204030204" pitchFamily="34" charset="0"/>
+                      </a:endParaRPr>
+                    </a:p>
+                  </a:txBody>
+                  <a:tcPr marL="9525" marR="9525" marT="9525" marB="0" anchor="b"/>
+                </a:tc>
+                <a:tc>
+                  <a:txBody>
+                    <a:bodyPr/>
+                    <a:lstStyle/>
+                    <a:p>
+                      <a:pPr algn="r" fontAlgn="b"/>
+                      <a:r>
+                        <a:rPr lang="en-US" sz="1200" u="none" strike="noStrike">
+                          <a:effectLst/>
+                        </a:rPr>
+                        <a:t>2</a:t>
+                      </a:r>
+                      <a:endParaRPr lang="en-US" sz="1200" b="0" i="0" u="none" strike="noStrike">
+                        <a:solidFill>
+                          <a:srgbClr val="000000"/>
+                        </a:solidFill>
+                        <a:effectLst/>
+                        <a:latin typeface="Calibri" panose="020F0502020204030204" pitchFamily="34" charset="0"/>
+                      </a:endParaRPr>
+                    </a:p>
+                  </a:txBody>
+                  <a:tcPr marL="9525" marR="9525" marT="9525" marB="0" anchor="b"/>
+                </a:tc>
+                <a:extLst>
+                  <a:ext uri="{0D108BD9-81ED-4DB2-BD59-A6C34878D82A}">
+                    <a16:rowId xmlns:a16="http://schemas.microsoft.com/office/drawing/2014/main" val="1093771944"/>
+                  </a:ext>
+                </a:extLst>
+              </a:tr>
+              <a:tr h="219982">
+                <a:tc>
+                  <a:txBody>
+                    <a:bodyPr/>
+                    <a:lstStyle/>
+                    <a:p>
+                      <a:pPr algn="r" fontAlgn="b"/>
+                      <a:r>
+                        <a:rPr lang="en-US" sz="1200" u="none" strike="noStrike" dirty="0">
+                          <a:effectLst/>
+                        </a:rPr>
+                        <a:t>7</a:t>
+                      </a:r>
+                      <a:endParaRPr lang="en-US" sz="1200" b="0" i="0" u="none" strike="noStrike" dirty="0">
+                        <a:solidFill>
+                          <a:srgbClr val="000000"/>
+                        </a:solidFill>
+                        <a:effectLst/>
+                        <a:latin typeface="Calibri" panose="020F0502020204030204" pitchFamily="34" charset="0"/>
+                      </a:endParaRPr>
+                    </a:p>
+                  </a:txBody>
+                  <a:tcPr marL="9525" marR="9525" marT="9525" marB="0" anchor="b"/>
+                </a:tc>
+                <a:tc>
+                  <a:txBody>
+                    <a:bodyPr/>
+                    <a:lstStyle/>
+                    <a:p>
+                      <a:pPr algn="l" fontAlgn="b"/>
+                      <a:r>
+                        <a:rPr lang="en-US" sz="1200" u="none" strike="noStrike" dirty="0">
+                          <a:effectLst/>
+                        </a:rPr>
+                        <a:t>Log info</a:t>
+                      </a:r>
+                      <a:endParaRPr lang="en-US" sz="1200" b="0" i="0" u="none" strike="noStrike" dirty="0">
+                        <a:solidFill>
+                          <a:srgbClr val="000000"/>
+                        </a:solidFill>
+                        <a:effectLst/>
+                        <a:latin typeface="Calibri" panose="020F0502020204030204" pitchFamily="34" charset="0"/>
+                      </a:endParaRPr>
+                    </a:p>
+                  </a:txBody>
+                  <a:tcPr marL="9525" marR="9525" marT="9525" marB="0" anchor="b"/>
+                </a:tc>
+                <a:tc>
+                  <a:txBody>
+                    <a:bodyPr/>
+                    <a:lstStyle/>
+                    <a:p>
+                      <a:pPr algn="l" fontAlgn="b"/>
+                      <a:r>
+                        <a:rPr lang="en-US" sz="1200" u="none" strike="noStrike">
+                          <a:effectLst/>
+                        </a:rPr>
+                        <a:t>trainer</a:t>
+                      </a:r>
+                      <a:endParaRPr lang="en-US" sz="1200" b="0" i="0" u="none" strike="noStrike">
+                        <a:solidFill>
+                          <a:srgbClr val="000000"/>
+                        </a:solidFill>
+                        <a:effectLst/>
+                        <a:latin typeface="Calibri" panose="020F0502020204030204" pitchFamily="34" charset="0"/>
+                      </a:endParaRPr>
+                    </a:p>
+                  </a:txBody>
+                  <a:tcPr marL="9525" marR="9525" marT="9525" marB="0" anchor="b"/>
+                </a:tc>
+                <a:tc>
+                  <a:txBody>
+                    <a:bodyPr/>
+                    <a:lstStyle/>
+                    <a:p>
+                      <a:pPr algn="l" fontAlgn="b"/>
+                      <a:r>
+                        <a:rPr lang="en-US" sz="1200" u="none" strike="noStrike">
+                          <a:effectLst/>
+                        </a:rPr>
+                        <a:t>external</a:t>
+                      </a:r>
+                      <a:endParaRPr lang="en-US" sz="1200" b="0" i="0" u="none" strike="noStrike">
+                        <a:solidFill>
+                          <a:srgbClr val="000000"/>
+                        </a:solidFill>
+                        <a:effectLst/>
+                        <a:latin typeface="Calibri" panose="020F0502020204030204" pitchFamily="34" charset="0"/>
+                      </a:endParaRPr>
+                    </a:p>
+                  </a:txBody>
+                  <a:tcPr marL="9525" marR="9525" marT="9525" marB="0" anchor="b"/>
+                </a:tc>
+                <a:tc>
+                  <a:txBody>
+                    <a:bodyPr/>
+                    <a:lstStyle/>
+                    <a:p>
+                      <a:pPr algn="r" fontAlgn="b"/>
+                      <a:r>
+                        <a:rPr lang="en-US" sz="1200" u="none" strike="noStrike">
+                          <a:effectLst/>
+                        </a:rPr>
+                        <a:t>2</a:t>
+                      </a:r>
+                      <a:endParaRPr lang="en-US" sz="1200" b="0" i="0" u="none" strike="noStrike">
+                        <a:solidFill>
+                          <a:srgbClr val="000000"/>
+                        </a:solidFill>
+                        <a:effectLst/>
+                        <a:latin typeface="Calibri" panose="020F0502020204030204" pitchFamily="34" charset="0"/>
+                      </a:endParaRPr>
+                    </a:p>
+                  </a:txBody>
+                  <a:tcPr marL="9525" marR="9525" marT="9525" marB="0" anchor="b"/>
+                </a:tc>
+                <a:extLst>
+                  <a:ext uri="{0D108BD9-81ED-4DB2-BD59-A6C34878D82A}">
+                    <a16:rowId xmlns:a16="http://schemas.microsoft.com/office/drawing/2014/main" val="2875775512"/>
+                  </a:ext>
+                </a:extLst>
+              </a:tr>
+              <a:tr h="219982">
+                <a:tc>
+                  <a:txBody>
+                    <a:bodyPr/>
+                    <a:lstStyle/>
+                    <a:p>
+                      <a:pPr algn="r" fontAlgn="b"/>
+                      <a:r>
+                        <a:rPr lang="en-US" sz="1200" u="none" strike="noStrike" dirty="0">
+                          <a:effectLst/>
+                          <a:highlight>
+                            <a:srgbClr val="FFFF00"/>
+                          </a:highlight>
+                        </a:rPr>
+                        <a:t>8</a:t>
+                      </a:r>
+                      <a:endParaRPr lang="en-US" sz="1200" b="0" i="0" u="none" strike="noStrike" dirty="0">
+                        <a:solidFill>
+                          <a:srgbClr val="000000"/>
+                        </a:solidFill>
+                        <a:effectLst/>
+                        <a:highlight>
+                          <a:srgbClr val="FFFF00"/>
+                        </a:highlight>
+                        <a:latin typeface="Calibri" panose="020F0502020204030204" pitchFamily="34" charset="0"/>
+                      </a:endParaRPr>
+                    </a:p>
+                  </a:txBody>
+                  <a:tcPr marL="9525" marR="9525" marT="9525" marB="0" anchor="b">
+                    <a:solidFill>
+                      <a:srgbClr val="FFFF00"/>
+                    </a:solidFill>
+                  </a:tcPr>
+                </a:tc>
+                <a:tc>
+                  <a:txBody>
+                    <a:bodyPr/>
+                    <a:lstStyle/>
+                    <a:p>
+                      <a:pPr algn="l" fontAlgn="b"/>
+                      <a:r>
+                        <a:rPr lang="en-US" sz="1200" u="none" strike="noStrike" dirty="0">
+                          <a:effectLst/>
+                          <a:highlight>
+                            <a:srgbClr val="FFFF00"/>
+                          </a:highlight>
+                        </a:rPr>
+                        <a:t>Log info</a:t>
+                      </a:r>
+                      <a:endParaRPr lang="en-US" sz="1200" b="0" i="0" u="none" strike="noStrike" dirty="0">
+                        <a:solidFill>
+                          <a:srgbClr val="000000"/>
+                        </a:solidFill>
+                        <a:effectLst/>
+                        <a:highlight>
+                          <a:srgbClr val="FFFF00"/>
+                        </a:highlight>
+                        <a:latin typeface="Calibri" panose="020F0502020204030204" pitchFamily="34" charset="0"/>
+                      </a:endParaRPr>
+                    </a:p>
+                  </a:txBody>
+                  <a:tcPr marL="9525" marR="9525" marT="9525" marB="0" anchor="b">
+                    <a:solidFill>
+                      <a:srgbClr val="FFFF00"/>
+                    </a:solidFill>
+                  </a:tcPr>
+                </a:tc>
+                <a:tc>
+                  <a:txBody>
+                    <a:bodyPr/>
+                    <a:lstStyle/>
+                    <a:p>
+                      <a:pPr algn="l" fontAlgn="b"/>
+                      <a:r>
+                        <a:rPr lang="en-US" sz="1200" u="none" strike="noStrike">
+                          <a:effectLst/>
+                          <a:highlight>
+                            <a:srgbClr val="FFFF00"/>
+                          </a:highlight>
+                        </a:rPr>
+                        <a:t>customer</a:t>
+                      </a:r>
+                      <a:endParaRPr lang="en-US" sz="1200" b="0" i="0" u="none" strike="noStrike">
+                        <a:solidFill>
+                          <a:srgbClr val="000000"/>
+                        </a:solidFill>
+                        <a:effectLst/>
+                        <a:highlight>
+                          <a:srgbClr val="FFFF00"/>
+                        </a:highlight>
+                        <a:latin typeface="Calibri" panose="020F0502020204030204" pitchFamily="34" charset="0"/>
+                      </a:endParaRPr>
+                    </a:p>
+                  </a:txBody>
+                  <a:tcPr marL="9525" marR="9525" marT="9525" marB="0" anchor="b">
+                    <a:solidFill>
+                      <a:srgbClr val="FFFF00"/>
+                    </a:solidFill>
+                  </a:tcPr>
+                </a:tc>
+                <a:tc>
+                  <a:txBody>
+                    <a:bodyPr/>
+                    <a:lstStyle/>
+                    <a:p>
+                      <a:pPr algn="l" fontAlgn="b"/>
+                      <a:r>
+                        <a:rPr lang="en-US" sz="1200" u="none" strike="noStrike" dirty="0">
+                          <a:effectLst/>
+                          <a:highlight>
+                            <a:srgbClr val="FFFF00"/>
+                          </a:highlight>
+                        </a:rPr>
+                        <a:t>internal</a:t>
+                      </a:r>
+                      <a:endParaRPr lang="en-US" sz="1200" b="0" i="0" u="none" strike="noStrike" dirty="0">
+                        <a:solidFill>
+                          <a:srgbClr val="000000"/>
+                        </a:solidFill>
+                        <a:effectLst/>
+                        <a:highlight>
+                          <a:srgbClr val="FFFF00"/>
+                        </a:highlight>
+                        <a:latin typeface="Calibri" panose="020F0502020204030204" pitchFamily="34" charset="0"/>
+                      </a:endParaRPr>
+                    </a:p>
+                  </a:txBody>
+                  <a:tcPr marL="9525" marR="9525" marT="9525" marB="0" anchor="b">
+                    <a:solidFill>
+                      <a:srgbClr val="FFFF00"/>
+                    </a:solidFill>
+                  </a:tcPr>
+                </a:tc>
+                <a:tc>
+                  <a:txBody>
+                    <a:bodyPr/>
+                    <a:lstStyle/>
+                    <a:p>
+                      <a:pPr algn="r" fontAlgn="b"/>
+                      <a:r>
+                        <a:rPr lang="en-US" sz="1200" u="none" strike="noStrike" dirty="0">
+                          <a:effectLst/>
+                          <a:highlight>
+                            <a:srgbClr val="FFFF00"/>
+                          </a:highlight>
+                        </a:rPr>
+                        <a:t>2</a:t>
+                      </a:r>
+                      <a:endParaRPr lang="en-US" sz="1200" b="0" i="0" u="none" strike="noStrike" dirty="0">
+                        <a:solidFill>
+                          <a:srgbClr val="000000"/>
+                        </a:solidFill>
+                        <a:effectLst/>
+                        <a:highlight>
+                          <a:srgbClr val="FFFF00"/>
+                        </a:highlight>
+                        <a:latin typeface="Calibri" panose="020F0502020204030204" pitchFamily="34" charset="0"/>
+                      </a:endParaRPr>
+                    </a:p>
+                  </a:txBody>
+                  <a:tcPr marL="9525" marR="9525" marT="9525" marB="0" anchor="b">
+                    <a:solidFill>
+                      <a:srgbClr val="FFFF00"/>
+                    </a:solidFill>
+                  </a:tcPr>
+                </a:tc>
+                <a:extLst>
+                  <a:ext uri="{0D108BD9-81ED-4DB2-BD59-A6C34878D82A}">
+                    <a16:rowId xmlns:a16="http://schemas.microsoft.com/office/drawing/2014/main" val="900819454"/>
+                  </a:ext>
+                </a:extLst>
+              </a:tr>
+              <a:tr h="212267">
+                <a:tc>
+                  <a:txBody>
+                    <a:bodyPr/>
+                    <a:lstStyle/>
+                    <a:p>
+                      <a:pPr algn="r" fontAlgn="b"/>
+                      <a:r>
+                        <a:rPr lang="en-US" sz="1200" u="none" strike="noStrike">
+                          <a:effectLst/>
+                        </a:rPr>
+                        <a:t>9</a:t>
+                      </a:r>
+                      <a:endParaRPr lang="en-US" sz="1200" b="0" i="0" u="none" strike="noStrike">
+                        <a:solidFill>
+                          <a:srgbClr val="000000"/>
+                        </a:solidFill>
+                        <a:effectLst/>
+                        <a:latin typeface="Calibri" panose="020F0502020204030204" pitchFamily="34" charset="0"/>
+                      </a:endParaRPr>
+                    </a:p>
+                  </a:txBody>
+                  <a:tcPr marL="9525" marR="9525" marT="9525" marB="0" anchor="b"/>
+                </a:tc>
+                <a:tc>
+                  <a:txBody>
+                    <a:bodyPr/>
+                    <a:lstStyle/>
+                    <a:p>
+                      <a:pPr algn="l" fontAlgn="b"/>
+                      <a:r>
+                        <a:rPr lang="en-US" sz="1200" u="none" strike="noStrike">
+                          <a:effectLst/>
+                        </a:rPr>
+                        <a:t>Log workout</a:t>
+                      </a:r>
+                      <a:endParaRPr lang="en-US" sz="1200" b="0" i="0" u="none" strike="noStrike">
+                        <a:solidFill>
+                          <a:srgbClr val="000000"/>
+                        </a:solidFill>
+                        <a:effectLst/>
+                        <a:latin typeface="Calibri" panose="020F0502020204030204" pitchFamily="34" charset="0"/>
+                      </a:endParaRPr>
+                    </a:p>
+                  </a:txBody>
+                  <a:tcPr marL="9525" marR="9525" marT="9525" marB="0" anchor="b"/>
+                </a:tc>
+                <a:tc>
+                  <a:txBody>
+                    <a:bodyPr/>
+                    <a:lstStyle/>
+                    <a:p>
+                      <a:pPr algn="l" fontAlgn="b"/>
+                      <a:r>
+                        <a:rPr lang="en-US" sz="1200" u="none" strike="noStrike">
+                          <a:effectLst/>
+                        </a:rPr>
+                        <a:t>trainer</a:t>
+                      </a:r>
+                      <a:endParaRPr lang="en-US" sz="1200" b="0" i="0" u="none" strike="noStrike">
+                        <a:solidFill>
+                          <a:srgbClr val="000000"/>
+                        </a:solidFill>
+                        <a:effectLst/>
+                        <a:latin typeface="Calibri" panose="020F0502020204030204" pitchFamily="34" charset="0"/>
+                      </a:endParaRPr>
+                    </a:p>
+                  </a:txBody>
+                  <a:tcPr marL="9525" marR="9525" marT="9525" marB="0" anchor="b"/>
+                </a:tc>
+                <a:tc>
+                  <a:txBody>
+                    <a:bodyPr/>
+                    <a:lstStyle/>
+                    <a:p>
+                      <a:pPr algn="l" fontAlgn="b"/>
+                      <a:r>
+                        <a:rPr lang="en-US" sz="1200" u="none" strike="noStrike">
+                          <a:effectLst/>
+                        </a:rPr>
+                        <a:t>internal</a:t>
+                      </a:r>
+                      <a:endParaRPr lang="en-US" sz="1200" b="0" i="0" u="none" strike="noStrike">
+                        <a:solidFill>
+                          <a:srgbClr val="000000"/>
+                        </a:solidFill>
+                        <a:effectLst/>
+                        <a:latin typeface="Calibri" panose="020F0502020204030204" pitchFamily="34" charset="0"/>
+                      </a:endParaRPr>
+                    </a:p>
+                  </a:txBody>
+                  <a:tcPr marL="9525" marR="9525" marT="9525" marB="0" anchor="b"/>
+                </a:tc>
+                <a:tc>
+                  <a:txBody>
+                    <a:bodyPr/>
+                    <a:lstStyle/>
+                    <a:p>
+                      <a:pPr algn="r" fontAlgn="b"/>
+                      <a:r>
+                        <a:rPr lang="en-US" sz="1200" u="none" strike="noStrike">
+                          <a:effectLst/>
+                        </a:rPr>
+                        <a:t>2</a:t>
+                      </a:r>
+                      <a:endParaRPr lang="en-US" sz="1200" b="0" i="0" u="none" strike="noStrike">
+                        <a:solidFill>
+                          <a:srgbClr val="000000"/>
+                        </a:solidFill>
+                        <a:effectLst/>
+                        <a:latin typeface="Calibri" panose="020F0502020204030204" pitchFamily="34" charset="0"/>
+                      </a:endParaRPr>
+                    </a:p>
+                  </a:txBody>
+                  <a:tcPr marL="9525" marR="9525" marT="9525" marB="0" anchor="b"/>
+                </a:tc>
+                <a:extLst>
+                  <a:ext uri="{0D108BD9-81ED-4DB2-BD59-A6C34878D82A}">
+                    <a16:rowId xmlns:a16="http://schemas.microsoft.com/office/drawing/2014/main" val="2243580629"/>
+                  </a:ext>
+                </a:extLst>
+              </a:tr>
+              <a:tr h="219982">
+                <a:tc>
+                  <a:txBody>
+                    <a:bodyPr/>
+                    <a:lstStyle/>
+                    <a:p>
+                      <a:pPr algn="r" fontAlgn="b"/>
+                      <a:r>
+                        <a:rPr lang="en-US" sz="1200" u="none" strike="noStrike" dirty="0">
+                          <a:effectLst/>
+                        </a:rPr>
+                        <a:t>10</a:t>
+                      </a:r>
+                      <a:endParaRPr lang="en-US" sz="1200" b="0" i="0" u="none" strike="noStrike" dirty="0">
+                        <a:solidFill>
+                          <a:srgbClr val="000000"/>
+                        </a:solidFill>
+                        <a:effectLst/>
+                        <a:latin typeface="Calibri" panose="020F0502020204030204" pitchFamily="34" charset="0"/>
+                      </a:endParaRPr>
+                    </a:p>
+                  </a:txBody>
+                  <a:tcPr marL="9525" marR="9525" marT="9525" marB="0" anchor="b">
+                    <a:solidFill>
+                      <a:srgbClr val="FFFF00"/>
+                    </a:solidFill>
+                  </a:tcPr>
+                </a:tc>
+                <a:tc>
+                  <a:txBody>
+                    <a:bodyPr/>
+                    <a:lstStyle/>
+                    <a:p>
+                      <a:pPr algn="l" fontAlgn="b"/>
+                      <a:r>
+                        <a:rPr lang="en-US" sz="1200" u="none" strike="noStrike" dirty="0">
+                          <a:effectLst/>
+                        </a:rPr>
+                        <a:t>Log workout</a:t>
+                      </a:r>
+                      <a:endParaRPr lang="en-US" sz="1200" b="0" i="0" u="none" strike="noStrike" dirty="0">
+                        <a:solidFill>
+                          <a:srgbClr val="000000"/>
+                        </a:solidFill>
+                        <a:effectLst/>
+                        <a:latin typeface="Calibri" panose="020F0502020204030204" pitchFamily="34" charset="0"/>
+                      </a:endParaRPr>
+                    </a:p>
+                  </a:txBody>
+                  <a:tcPr marL="9525" marR="9525" marT="9525" marB="0" anchor="b">
+                    <a:solidFill>
+                      <a:srgbClr val="FFFF00"/>
+                    </a:solidFill>
+                  </a:tcPr>
+                </a:tc>
+                <a:tc>
+                  <a:txBody>
+                    <a:bodyPr/>
+                    <a:lstStyle/>
+                    <a:p>
+                      <a:pPr algn="l" fontAlgn="b"/>
+                      <a:r>
+                        <a:rPr lang="en-US" sz="1200" u="none" strike="noStrike" dirty="0">
+                          <a:effectLst/>
+                        </a:rPr>
+                        <a:t>customer</a:t>
+                      </a:r>
+                      <a:endParaRPr lang="en-US" sz="1200" b="0" i="0" u="none" strike="noStrike" dirty="0">
+                        <a:solidFill>
+                          <a:srgbClr val="000000"/>
+                        </a:solidFill>
+                        <a:effectLst/>
+                        <a:latin typeface="Calibri" panose="020F0502020204030204" pitchFamily="34" charset="0"/>
+                      </a:endParaRPr>
+                    </a:p>
+                  </a:txBody>
+                  <a:tcPr marL="9525" marR="9525" marT="9525" marB="0" anchor="b">
+                    <a:solidFill>
+                      <a:srgbClr val="FFFF00"/>
+                    </a:solidFill>
+                  </a:tcPr>
+                </a:tc>
+                <a:tc>
+                  <a:txBody>
+                    <a:bodyPr/>
+                    <a:lstStyle/>
+                    <a:p>
+                      <a:pPr algn="l" fontAlgn="b"/>
+                      <a:r>
+                        <a:rPr lang="en-US" sz="1200" u="none" strike="noStrike" dirty="0">
+                          <a:effectLst/>
+                        </a:rPr>
+                        <a:t>external</a:t>
+                      </a:r>
+                      <a:endParaRPr lang="en-US" sz="1200" b="0" i="0" u="none" strike="noStrike" dirty="0">
+                        <a:solidFill>
+                          <a:srgbClr val="000000"/>
+                        </a:solidFill>
+                        <a:effectLst/>
+                        <a:latin typeface="Calibri" panose="020F0502020204030204" pitchFamily="34" charset="0"/>
+                      </a:endParaRPr>
+                    </a:p>
+                  </a:txBody>
+                  <a:tcPr marL="9525" marR="9525" marT="9525" marB="0" anchor="b">
+                    <a:solidFill>
+                      <a:srgbClr val="FFFF00"/>
+                    </a:solidFill>
+                  </a:tcPr>
+                </a:tc>
+                <a:tc>
+                  <a:txBody>
+                    <a:bodyPr/>
+                    <a:lstStyle/>
+                    <a:p>
+                      <a:pPr algn="r" fontAlgn="b"/>
+                      <a:r>
+                        <a:rPr lang="en-US" sz="1200" u="none" strike="noStrike" dirty="0">
+                          <a:effectLst/>
+                        </a:rPr>
+                        <a:t>2</a:t>
+                      </a:r>
+                      <a:endParaRPr lang="en-US" sz="1200" b="0" i="0" u="none" strike="noStrike" dirty="0">
+                        <a:solidFill>
+                          <a:srgbClr val="000000"/>
+                        </a:solidFill>
+                        <a:effectLst/>
+                        <a:latin typeface="Calibri" panose="020F0502020204030204" pitchFamily="34" charset="0"/>
+                      </a:endParaRPr>
+                    </a:p>
+                  </a:txBody>
+                  <a:tcPr marL="9525" marR="9525" marT="9525" marB="0" anchor="b">
+                    <a:solidFill>
+                      <a:srgbClr val="FFFF00"/>
+                    </a:solidFill>
+                  </a:tcPr>
+                </a:tc>
+                <a:extLst>
+                  <a:ext uri="{0D108BD9-81ED-4DB2-BD59-A6C34878D82A}">
+                    <a16:rowId xmlns:a16="http://schemas.microsoft.com/office/drawing/2014/main" val="827678876"/>
+                  </a:ext>
+                </a:extLst>
+              </a:tr>
+              <a:tr h="219982">
+                <a:tc>
+                  <a:txBody>
+                    <a:bodyPr/>
+                    <a:lstStyle/>
+                    <a:p>
+                      <a:pPr algn="r" fontAlgn="b"/>
+                      <a:r>
+                        <a:rPr lang="en-US" sz="1200" u="none" strike="noStrike" dirty="0">
+                          <a:effectLst/>
+                        </a:rPr>
+                        <a:t>11</a:t>
+                      </a:r>
+                      <a:endParaRPr lang="en-US" sz="1200" b="0" i="0" u="none" strike="noStrike" dirty="0">
+                        <a:solidFill>
+                          <a:srgbClr val="000000"/>
+                        </a:solidFill>
+                        <a:effectLst/>
+                        <a:latin typeface="Calibri" panose="020F0502020204030204" pitchFamily="34" charset="0"/>
+                      </a:endParaRPr>
+                    </a:p>
+                  </a:txBody>
+                  <a:tcPr marL="9525" marR="9525" marT="9525" marB="0" anchor="b"/>
+                </a:tc>
+                <a:tc>
+                  <a:txBody>
+                    <a:bodyPr/>
+                    <a:lstStyle/>
+                    <a:p>
+                      <a:pPr algn="l" fontAlgn="b"/>
+                      <a:r>
+                        <a:rPr lang="en-US" sz="1200" u="none" strike="noStrike" dirty="0">
+                          <a:effectLst/>
+                        </a:rPr>
+                        <a:t>Log schedule</a:t>
+                      </a:r>
+                      <a:endParaRPr lang="en-US" sz="1200" b="0" i="0" u="none" strike="noStrike" dirty="0">
+                        <a:solidFill>
+                          <a:srgbClr val="000000"/>
+                        </a:solidFill>
+                        <a:effectLst/>
+                        <a:latin typeface="Calibri" panose="020F0502020204030204" pitchFamily="34" charset="0"/>
+                      </a:endParaRPr>
+                    </a:p>
+                  </a:txBody>
+                  <a:tcPr marL="9525" marR="9525" marT="9525" marB="0" anchor="b"/>
+                </a:tc>
+                <a:tc>
+                  <a:txBody>
+                    <a:bodyPr/>
+                    <a:lstStyle/>
+                    <a:p>
+                      <a:pPr algn="l" fontAlgn="b"/>
+                      <a:r>
+                        <a:rPr lang="en-US" sz="1200" u="none" strike="noStrike" dirty="0">
+                          <a:effectLst/>
+                        </a:rPr>
+                        <a:t>trainer</a:t>
+                      </a:r>
+                      <a:endParaRPr lang="en-US" sz="1200" b="0" i="0" u="none" strike="noStrike" dirty="0">
+                        <a:solidFill>
+                          <a:srgbClr val="000000"/>
+                        </a:solidFill>
+                        <a:effectLst/>
+                        <a:latin typeface="Calibri" panose="020F0502020204030204" pitchFamily="34" charset="0"/>
+                      </a:endParaRPr>
+                    </a:p>
+                  </a:txBody>
+                  <a:tcPr marL="9525" marR="9525" marT="9525" marB="0" anchor="b"/>
+                </a:tc>
+                <a:tc>
+                  <a:txBody>
+                    <a:bodyPr/>
+                    <a:lstStyle/>
+                    <a:p>
+                      <a:pPr algn="l" fontAlgn="b"/>
+                      <a:r>
+                        <a:rPr lang="en-US" sz="1200" u="none" strike="noStrike" dirty="0">
+                          <a:effectLst/>
+                        </a:rPr>
+                        <a:t>external</a:t>
+                      </a:r>
+                      <a:endParaRPr lang="en-US" sz="1200" b="0" i="0" u="none" strike="noStrike" dirty="0">
+                        <a:solidFill>
+                          <a:srgbClr val="000000"/>
+                        </a:solidFill>
+                        <a:effectLst/>
+                        <a:latin typeface="Calibri" panose="020F0502020204030204" pitchFamily="34" charset="0"/>
+                      </a:endParaRPr>
+                    </a:p>
+                  </a:txBody>
+                  <a:tcPr marL="9525" marR="9525" marT="9525" marB="0" anchor="b"/>
+                </a:tc>
+                <a:tc>
+                  <a:txBody>
+                    <a:bodyPr/>
+                    <a:lstStyle/>
+                    <a:p>
+                      <a:pPr algn="r" fontAlgn="b"/>
+                      <a:r>
+                        <a:rPr lang="en-US" sz="1200" u="none" strike="noStrike" dirty="0">
+                          <a:effectLst/>
+                        </a:rPr>
+                        <a:t>2</a:t>
+                      </a:r>
+                      <a:endParaRPr lang="en-US" sz="1200" b="0" i="0" u="none" strike="noStrike" dirty="0">
+                        <a:solidFill>
+                          <a:srgbClr val="000000"/>
+                        </a:solidFill>
+                        <a:effectLst/>
+                        <a:latin typeface="Calibri" panose="020F0502020204030204" pitchFamily="34" charset="0"/>
+                      </a:endParaRPr>
+                    </a:p>
+                  </a:txBody>
+                  <a:tcPr marL="9525" marR="9525" marT="9525" marB="0" anchor="b"/>
+                </a:tc>
+                <a:extLst>
+                  <a:ext uri="{0D108BD9-81ED-4DB2-BD59-A6C34878D82A}">
+                    <a16:rowId xmlns:a16="http://schemas.microsoft.com/office/drawing/2014/main" val="3073027346"/>
+                  </a:ext>
+                </a:extLst>
+              </a:tr>
+              <a:tr h="219982">
+                <a:tc>
+                  <a:txBody>
+                    <a:bodyPr/>
+                    <a:lstStyle/>
+                    <a:p>
+                      <a:pPr algn="r" fontAlgn="b"/>
+                      <a:r>
+                        <a:rPr lang="en-US" sz="1200" u="none" strike="noStrike" dirty="0">
+                          <a:effectLst/>
+                        </a:rPr>
+                        <a:t>12</a:t>
+                      </a:r>
+                      <a:endParaRPr lang="en-US" sz="1200" b="0" i="0" u="none" strike="noStrike" dirty="0">
+                        <a:solidFill>
+                          <a:srgbClr val="000000"/>
+                        </a:solidFill>
+                        <a:effectLst/>
+                        <a:latin typeface="Calibri" panose="020F0502020204030204" pitchFamily="34" charset="0"/>
+                      </a:endParaRPr>
+                    </a:p>
+                  </a:txBody>
+                  <a:tcPr marL="9525" marR="9525" marT="9525" marB="0" anchor="b">
+                    <a:solidFill>
+                      <a:srgbClr val="FFFF00"/>
+                    </a:solidFill>
+                  </a:tcPr>
+                </a:tc>
+                <a:tc>
+                  <a:txBody>
+                    <a:bodyPr/>
+                    <a:lstStyle/>
+                    <a:p>
+                      <a:pPr algn="l" fontAlgn="b"/>
+                      <a:r>
+                        <a:rPr lang="en-US" sz="1200" u="none" strike="noStrike" dirty="0">
+                          <a:effectLst/>
+                        </a:rPr>
+                        <a:t>Log schedule</a:t>
+                      </a:r>
+                      <a:endParaRPr lang="en-US" sz="1200" b="0" i="0" u="none" strike="noStrike" dirty="0">
+                        <a:solidFill>
+                          <a:srgbClr val="000000"/>
+                        </a:solidFill>
+                        <a:effectLst/>
+                        <a:latin typeface="Calibri" panose="020F0502020204030204" pitchFamily="34" charset="0"/>
+                      </a:endParaRPr>
+                    </a:p>
+                  </a:txBody>
+                  <a:tcPr marL="9525" marR="9525" marT="9525" marB="0" anchor="b">
+                    <a:solidFill>
+                      <a:srgbClr val="FFFF00"/>
+                    </a:solidFill>
+                  </a:tcPr>
+                </a:tc>
+                <a:tc>
+                  <a:txBody>
+                    <a:bodyPr/>
+                    <a:lstStyle/>
+                    <a:p>
+                      <a:pPr algn="l" fontAlgn="b"/>
+                      <a:r>
+                        <a:rPr lang="en-US" sz="1200" u="none" strike="noStrike" dirty="0">
+                          <a:effectLst/>
+                        </a:rPr>
+                        <a:t>customer</a:t>
+                      </a:r>
+                      <a:endParaRPr lang="en-US" sz="1200" b="0" i="0" u="none" strike="noStrike" dirty="0">
+                        <a:solidFill>
+                          <a:srgbClr val="000000"/>
+                        </a:solidFill>
+                        <a:effectLst/>
+                        <a:latin typeface="Calibri" panose="020F0502020204030204" pitchFamily="34" charset="0"/>
+                      </a:endParaRPr>
+                    </a:p>
+                  </a:txBody>
+                  <a:tcPr marL="9525" marR="9525" marT="9525" marB="0" anchor="b">
+                    <a:solidFill>
+                      <a:srgbClr val="FFFF00"/>
+                    </a:solidFill>
+                  </a:tcPr>
+                </a:tc>
+                <a:tc>
+                  <a:txBody>
+                    <a:bodyPr/>
+                    <a:lstStyle/>
+                    <a:p>
+                      <a:pPr algn="l" fontAlgn="b"/>
+                      <a:r>
+                        <a:rPr lang="en-US" sz="1200" u="none" strike="noStrike" dirty="0">
+                          <a:effectLst/>
+                        </a:rPr>
+                        <a:t>internal</a:t>
+                      </a:r>
+                      <a:endParaRPr lang="en-US" sz="1200" b="0" i="0" u="none" strike="noStrike" dirty="0">
+                        <a:solidFill>
+                          <a:srgbClr val="000000"/>
+                        </a:solidFill>
+                        <a:effectLst/>
+                        <a:latin typeface="Calibri" panose="020F0502020204030204" pitchFamily="34" charset="0"/>
+                      </a:endParaRPr>
+                    </a:p>
+                  </a:txBody>
+                  <a:tcPr marL="9525" marR="9525" marT="9525" marB="0" anchor="b">
+                    <a:solidFill>
+                      <a:srgbClr val="FFFF00"/>
+                    </a:solidFill>
+                  </a:tcPr>
+                </a:tc>
+                <a:tc>
+                  <a:txBody>
+                    <a:bodyPr/>
+                    <a:lstStyle/>
+                    <a:p>
+                      <a:pPr algn="r" fontAlgn="b"/>
+                      <a:r>
+                        <a:rPr lang="en-US" sz="1200" u="none" strike="noStrike" dirty="0">
+                          <a:effectLst/>
+                        </a:rPr>
+                        <a:t>2</a:t>
+                      </a:r>
+                      <a:endParaRPr lang="en-US" sz="1200" b="0" i="0" u="none" strike="noStrike" dirty="0">
+                        <a:solidFill>
+                          <a:srgbClr val="000000"/>
+                        </a:solidFill>
+                        <a:effectLst/>
+                        <a:latin typeface="Calibri" panose="020F0502020204030204" pitchFamily="34" charset="0"/>
+                      </a:endParaRPr>
+                    </a:p>
+                  </a:txBody>
+                  <a:tcPr marL="9525" marR="9525" marT="9525" marB="0" anchor="b">
+                    <a:solidFill>
+                      <a:srgbClr val="FFFF00"/>
+                    </a:solidFill>
+                  </a:tcPr>
+                </a:tc>
+                <a:extLst>
+                  <a:ext uri="{0D108BD9-81ED-4DB2-BD59-A6C34878D82A}">
+                    <a16:rowId xmlns:a16="http://schemas.microsoft.com/office/drawing/2014/main" val="564533195"/>
+                  </a:ext>
+                </a:extLst>
+              </a:tr>
+            </a:tbl>
+          </a:graphicData>
+        </a:graphic>
+      </p:graphicFrame>
       <p:sp>
         <p:nvSpPr>
           <p:cNvPr id="4" name="TextBox 3">
@@ -17995,7 +19856,7 @@
                   <a:schemeClr val="bg1"/>
                 </a:solidFill>
               </a:rPr>
-              <a:t>     Lorem ipsum dolor sit </a:t>
+              <a:t>When mapping test cases to use cases, a lot of variables have to be considered. Using </a:t>
             </a:r>
             <a:r>
               <a:rPr lang="en-US" sz="1400" dirty="0" err="1">
@@ -18003,7 +19864,7 @@
                   <a:schemeClr val="bg1"/>
                 </a:solidFill>
               </a:rPr>
-              <a:t>amet</a:t>
+              <a:t>AllPairs</a:t>
             </a:r>
             <a:r>
               <a:rPr lang="en-US" sz="1400" dirty="0">
@@ -18011,248 +19872,21 @@
                   <a:schemeClr val="bg1"/>
                 </a:solidFill>
               </a:rPr>
-              <a:t>, </a:t>
+              <a:t> was helpful in narrowing down and organizing </a:t>
             </a:r>
             <a:r>
-              <a:rPr lang="en-US" sz="1400" dirty="0" err="1">
+              <a:rPr lang="en-US" sz="1400">
                 <a:solidFill>
                   <a:schemeClr val="bg1"/>
                 </a:solidFill>
               </a:rPr>
-              <a:t>consectetur</a:t>
+              <a:t>test cases.</a:t>
             </a:r>
-            <a:r>
-              <a:rPr lang="en-US" sz="1400" dirty="0">
-                <a:solidFill>
-                  <a:schemeClr val="bg1"/>
-                </a:solidFill>
-              </a:rPr>
-              <a:t> </a:t>
-            </a:r>
-            <a:r>
-              <a:rPr lang="en-US" sz="1400" dirty="0" err="1">
-                <a:solidFill>
-                  <a:schemeClr val="bg1"/>
-                </a:solidFill>
-              </a:rPr>
-              <a:t>adipiscing</a:t>
-            </a:r>
-            <a:r>
-              <a:rPr lang="en-US" sz="1400" dirty="0">
-                <a:solidFill>
-                  <a:schemeClr val="bg1"/>
-                </a:solidFill>
-              </a:rPr>
-              <a:t> </a:t>
-            </a:r>
-            <a:r>
-              <a:rPr lang="en-US" sz="1400" dirty="0" err="1">
-                <a:solidFill>
-                  <a:schemeClr val="bg1"/>
-                </a:solidFill>
-              </a:rPr>
-              <a:t>elit</a:t>
-            </a:r>
-            <a:r>
-              <a:rPr lang="en-US" sz="1400" dirty="0">
-                <a:solidFill>
-                  <a:schemeClr val="bg1"/>
-                </a:solidFill>
-              </a:rPr>
-              <a:t>. </a:t>
-            </a:r>
-            <a:r>
-              <a:rPr lang="en-US" sz="1400" dirty="0" err="1">
-                <a:solidFill>
-                  <a:schemeClr val="bg1"/>
-                </a:solidFill>
-              </a:rPr>
-              <a:t>Praesent</a:t>
-            </a:r>
-            <a:r>
-              <a:rPr lang="en-US" sz="1400" dirty="0">
-                <a:solidFill>
-                  <a:schemeClr val="bg1"/>
-                </a:solidFill>
-              </a:rPr>
-              <a:t> </a:t>
-            </a:r>
-            <a:r>
-              <a:rPr lang="en-US" sz="1400" dirty="0" err="1">
-                <a:solidFill>
-                  <a:schemeClr val="bg1"/>
-                </a:solidFill>
-              </a:rPr>
-              <a:t>finibus</a:t>
-            </a:r>
-            <a:r>
-              <a:rPr lang="en-US" sz="1400" dirty="0">
-                <a:solidFill>
-                  <a:schemeClr val="bg1"/>
-                </a:solidFill>
-              </a:rPr>
-              <a:t> </a:t>
-            </a:r>
-            <a:r>
-              <a:rPr lang="en-US" sz="1400" dirty="0" err="1">
-                <a:solidFill>
-                  <a:schemeClr val="bg1"/>
-                </a:solidFill>
-              </a:rPr>
-              <a:t>turpis</a:t>
-            </a:r>
-            <a:r>
-              <a:rPr lang="en-US" sz="1400" dirty="0">
-                <a:solidFill>
-                  <a:schemeClr val="bg1"/>
-                </a:solidFill>
-              </a:rPr>
-              <a:t> at </a:t>
-            </a:r>
-            <a:r>
-              <a:rPr lang="en-US" sz="1400" dirty="0" err="1">
-                <a:solidFill>
-                  <a:schemeClr val="bg1"/>
-                </a:solidFill>
-              </a:rPr>
-              <a:t>lacinia</a:t>
-            </a:r>
-            <a:r>
-              <a:rPr lang="en-US" sz="1400" dirty="0">
-                <a:solidFill>
-                  <a:schemeClr val="bg1"/>
-                </a:solidFill>
-              </a:rPr>
-              <a:t> </a:t>
-            </a:r>
-            <a:r>
-              <a:rPr lang="en-US" sz="1400" dirty="0" err="1">
-                <a:solidFill>
-                  <a:schemeClr val="bg1"/>
-                </a:solidFill>
-              </a:rPr>
-              <a:t>venenatis</a:t>
-            </a:r>
-            <a:r>
-              <a:rPr lang="en-US" sz="1400" dirty="0">
-                <a:solidFill>
-                  <a:schemeClr val="bg1"/>
-                </a:solidFill>
-              </a:rPr>
-              <a:t>. </a:t>
-            </a:r>
-            <a:r>
-              <a:rPr lang="en-US" sz="1400" dirty="0" err="1">
-                <a:solidFill>
-                  <a:schemeClr val="bg1"/>
-                </a:solidFill>
-              </a:rPr>
-              <a:t>Morbi</a:t>
-            </a:r>
-            <a:r>
-              <a:rPr lang="en-US" sz="1400" dirty="0">
-                <a:solidFill>
-                  <a:schemeClr val="bg1"/>
-                </a:solidFill>
-              </a:rPr>
-              <a:t> </a:t>
-            </a:r>
-            <a:r>
-              <a:rPr lang="en-US" sz="1400" dirty="0" err="1">
-                <a:solidFill>
-                  <a:schemeClr val="bg1"/>
-                </a:solidFill>
-              </a:rPr>
-              <a:t>laoreet</a:t>
-            </a:r>
-            <a:r>
-              <a:rPr lang="en-US" sz="1400" dirty="0">
-                <a:solidFill>
-                  <a:schemeClr val="bg1"/>
-                </a:solidFill>
-              </a:rPr>
-              <a:t> </a:t>
-            </a:r>
-            <a:r>
-              <a:rPr lang="en-US" sz="1400" dirty="0" err="1">
-                <a:solidFill>
-                  <a:schemeClr val="bg1"/>
-                </a:solidFill>
-              </a:rPr>
-              <a:t>tortor</a:t>
-            </a:r>
-            <a:r>
-              <a:rPr lang="en-US" sz="1400" dirty="0">
-                <a:solidFill>
-                  <a:schemeClr val="bg1"/>
-                </a:solidFill>
-              </a:rPr>
-              <a:t> dolor, </a:t>
-            </a:r>
-            <a:r>
-              <a:rPr lang="en-US" sz="1400" dirty="0" err="1">
-                <a:solidFill>
-                  <a:schemeClr val="bg1"/>
-                </a:solidFill>
-              </a:rPr>
-              <a:t>sed</a:t>
-            </a:r>
-            <a:r>
-              <a:rPr lang="en-US" sz="1400" dirty="0">
-                <a:solidFill>
-                  <a:schemeClr val="bg1"/>
-                </a:solidFill>
-              </a:rPr>
-              <a:t> </a:t>
-            </a:r>
-            <a:r>
-              <a:rPr lang="en-US" sz="1400" dirty="0" err="1">
-                <a:solidFill>
-                  <a:schemeClr val="bg1"/>
-                </a:solidFill>
-              </a:rPr>
-              <a:t>luctus</a:t>
-            </a:r>
-            <a:r>
-              <a:rPr lang="en-US" sz="1400" dirty="0">
-                <a:solidFill>
-                  <a:schemeClr val="bg1"/>
-                </a:solidFill>
-              </a:rPr>
-              <a:t> </a:t>
-            </a:r>
-            <a:r>
-              <a:rPr lang="en-US" sz="1400" dirty="0" err="1">
-                <a:solidFill>
-                  <a:schemeClr val="bg1"/>
-                </a:solidFill>
-              </a:rPr>
-              <a:t>tellus</a:t>
-            </a:r>
-            <a:r>
-              <a:rPr lang="en-US" sz="1400" dirty="0">
-                <a:solidFill>
-                  <a:schemeClr val="bg1"/>
-                </a:solidFill>
-              </a:rPr>
-              <a:t> </a:t>
-            </a:r>
-            <a:r>
-              <a:rPr lang="en-US" sz="1400" dirty="0" err="1">
-                <a:solidFill>
-                  <a:schemeClr val="bg1"/>
-                </a:solidFill>
-              </a:rPr>
-              <a:t>lacinia</a:t>
-            </a:r>
-            <a:r>
-              <a:rPr lang="en-US" sz="1400" dirty="0">
-                <a:solidFill>
-                  <a:schemeClr val="bg1"/>
-                </a:solidFill>
-              </a:rPr>
-              <a:t>.</a:t>
-            </a:r>
+            <a:endParaRPr lang="en-US" sz="1400" dirty="0">
+              <a:solidFill>
+                <a:schemeClr val="bg1"/>
+              </a:solidFill>
+            </a:endParaRPr>
           </a:p>
         </p:txBody>
       </p:sp>

</xml_diff>

<commit_message>
Added final slide to the deck.
</commit_message>
<xml_diff>
--- a/Final Presenation/CS_633_Zac3_term_project_report_FINAL_draft.pptx
+++ b/Final Presenation/CS_633_Zac3_term_project_report_FINAL_draft.pptx
@@ -18482,38 +18482,15 @@
         </p:nvSpPr>
         <p:spPr/>
         <p:txBody>
-          <a:bodyPr/>
+          <a:bodyPr>
+            <a:normAutofit/>
+          </a:bodyPr>
           <a:lstStyle/>
           <a:p>
-            <a:pPr marL="0" indent="0">
-              <a:buNone/>
-            </a:pPr>
-            <a:endParaRPr lang="en-US" dirty="0"/>
-          </a:p>
-        </p:txBody>
-      </p:sp>
-      <p:sp>
-        <p:nvSpPr>
-          <p:cNvPr id="6" name="Content Placeholder 5">
-            <a:extLst>
-              <a:ext uri="{FF2B5EF4-FFF2-40B4-BE49-F238E27FC236}">
-                <a16:creationId xmlns:a16="http://schemas.microsoft.com/office/drawing/2014/main" id="{57A9D618-F249-DB40-AD13-54CEE032E94A}"/>
-              </a:ext>
-            </a:extLst>
-          </p:cNvPr>
-          <p:cNvSpPr>
-            <a:spLocks noGrp="1"/>
-          </p:cNvSpPr>
-          <p:nvPr>
-            <p:ph sz="quarter" idx="2"/>
-          </p:nvPr>
-        </p:nvSpPr>
-        <p:spPr/>
-        <p:txBody>
-          <a:bodyPr/>
-          <a:lstStyle/>
-          <a:p>
-            <a:endParaRPr lang="en-US"/>
+            <a:r>
+              <a:rPr lang="en-US" sz="2400" dirty="0"/>
+              <a:t>One functional defect was identified during test case 3. When logging schedules and workouts, the graphical charts were not updating to demonstrate the users full workout. </a:t>
+            </a:r>
           </a:p>
         </p:txBody>
       </p:sp>
@@ -18552,6 +18529,38 @@
           </a:p>
         </p:txBody>
       </p:sp>
+      <p:pic>
+        <p:nvPicPr>
+          <p:cNvPr id="7" name="Content Placeholder 6">
+            <a:extLst>
+              <a:ext uri="{FF2B5EF4-FFF2-40B4-BE49-F238E27FC236}">
+                <a16:creationId xmlns:a16="http://schemas.microsoft.com/office/drawing/2014/main" id="{00E53455-B3F5-4DD6-96E9-6C74C897EF10}"/>
+              </a:ext>
+            </a:extLst>
+          </p:cNvPr>
+          <p:cNvPicPr>
+            <a:picLocks noGrp="1" noChangeAspect="1"/>
+          </p:cNvPicPr>
+          <p:nvPr>
+            <p:ph sz="quarter" idx="2"/>
+          </p:nvPr>
+        </p:nvPicPr>
+        <p:blipFill>
+          <a:blip r:embed="rId2"/>
+          <a:stretch>
+            <a:fillRect/>
+          </a:stretch>
+        </p:blipFill>
+        <p:spPr>
+          <a:xfrm>
+            <a:off x="5023694" y="1192213"/>
+            <a:ext cx="3528912" cy="3429000"/>
+          </a:xfrm>
+          <a:prstGeom prst="rect">
+            <a:avLst/>
+          </a:prstGeom>
+        </p:spPr>
+      </p:pic>
     </p:spTree>
     <p:extLst>
       <p:ext uri="{BB962C8B-B14F-4D97-AF65-F5344CB8AC3E}">
@@ -19872,21 +19881,8 @@
                   <a:schemeClr val="bg1"/>
                 </a:solidFill>
               </a:rPr>
-              <a:t> was helpful in narrowing down and organizing </a:t>
+              <a:t> was helpful in narrowing down and organizing test cases.</a:t>
             </a:r>
-            <a:r>
-              <a:rPr lang="en-US" sz="1400">
-                <a:solidFill>
-                  <a:schemeClr val="bg1"/>
-                </a:solidFill>
-              </a:rPr>
-              <a:t>test cases.</a:t>
-            </a:r>
-            <a:endParaRPr lang="en-US" sz="1400" dirty="0">
-              <a:solidFill>
-                <a:schemeClr val="bg1"/>
-              </a:solidFill>
-            </a:endParaRPr>
           </a:p>
         </p:txBody>
       </p:sp>

</xml_diff>

<commit_message>
commiting final term project version
</commit_message>
<xml_diff>
--- a/Final Presenation/CS_633_Zac3_term_project_report_FINAL_draft.pptx
+++ b/Final Presenation/CS_633_Zac3_term_project_report_FINAL_draft.pptx
@@ -10451,14 +10451,14 @@
           <a:effectLst/>
           <a:extLst>
             <a:ext uri="{909E8E84-426E-40dd-AFC4-6F175D3DCCD1}">
-              <a14:hiddenFill xmlns:a14="http://schemas.microsoft.com/office/drawing/2010/main" xmlns="">
+              <a14:hiddenFill xmlns="" xmlns:a14="http://schemas.microsoft.com/office/drawing/2010/main">
                 <a:solidFill>
                   <a:schemeClr val="accent1"/>
                 </a:solidFill>
               </a14:hiddenFill>
             </a:ext>
             <a:ext uri="{91240B29-F687-4f45-9708-019B960494DF}">
-              <a14:hiddenLine xmlns:a14="http://schemas.microsoft.com/office/drawing/2010/main" xmlns="" w="9525">
+              <a14:hiddenLine xmlns="" xmlns:a14="http://schemas.microsoft.com/office/drawing/2010/main" w="9525">
                 <a:solidFill>
                   <a:schemeClr val="tx1"/>
                 </a:solidFill>
@@ -10468,7 +10468,7 @@
               </a14:hiddenLine>
             </a:ext>
             <a:ext uri="{AF507438-7753-43e0-B8FC-AC1667EBCBE1}">
-              <a14:hiddenEffects xmlns:a14="http://schemas.microsoft.com/office/drawing/2010/main" xmlns="">
+              <a14:hiddenEffects xmlns="" xmlns:a14="http://schemas.microsoft.com/office/drawing/2010/main">
                 <a:effectLst>
                   <a:outerShdw dist="35921" dir="2700000" algn="ctr" rotWithShape="0">
                     <a:schemeClr val="bg2"/>
@@ -10602,14 +10602,14 @@
           <a:effectLst/>
           <a:extLst>
             <a:ext uri="{909E8E84-426E-40dd-AFC4-6F175D3DCCD1}">
-              <a14:hiddenFill xmlns:a14="http://schemas.microsoft.com/office/drawing/2010/main" xmlns="">
+              <a14:hiddenFill xmlns="" xmlns:a14="http://schemas.microsoft.com/office/drawing/2010/main">
                 <a:solidFill>
                   <a:schemeClr val="accent1"/>
                 </a:solidFill>
               </a14:hiddenFill>
             </a:ext>
             <a:ext uri="{91240B29-F687-4f45-9708-019B960494DF}">
-              <a14:hiddenLine xmlns:a14="http://schemas.microsoft.com/office/drawing/2010/main" xmlns="" w="9525">
+              <a14:hiddenLine xmlns="" xmlns:a14="http://schemas.microsoft.com/office/drawing/2010/main" w="9525">
                 <a:solidFill>
                   <a:schemeClr val="tx1"/>
                 </a:solidFill>
@@ -10619,7 +10619,7 @@
               </a14:hiddenLine>
             </a:ext>
             <a:ext uri="{AF507438-7753-43e0-B8FC-AC1667EBCBE1}">
-              <a14:hiddenEffects xmlns:a14="http://schemas.microsoft.com/office/drawing/2010/main" xmlns="">
+              <a14:hiddenEffects xmlns="" xmlns:a14="http://schemas.microsoft.com/office/drawing/2010/main">
                 <a:effectLst>
                   <a:outerShdw dist="35921" dir="2700000" algn="ctr" rotWithShape="0">
                     <a:schemeClr val="bg2"/>
@@ -15444,29 +15444,28 @@
       </p:sp>
       <p:pic>
         <p:nvPicPr>
-          <p:cNvPr id="9" name="Content Placeholder 8">
+          <p:cNvPr id="5" name="Picture 4">
             <a:extLst>
               <a:ext uri="{FF2B5EF4-FFF2-40B4-BE49-F238E27FC236}">
-                <a16:creationId xmlns:a16="http://schemas.microsoft.com/office/drawing/2014/main" id="{99F634FB-BF67-45BB-A7A8-1A92BA955026}"/>
+                <a16:creationId xmlns:a16="http://schemas.microsoft.com/office/drawing/2014/main" id="{FCFF612C-77D3-408B-AF8F-4AE9DE92775A}"/>
               </a:ext>
             </a:extLst>
           </p:cNvPr>
           <p:cNvPicPr>
-            <a:picLocks noGrp="1" noChangeAspect="1"/>
+            <a:picLocks noChangeAspect="1"/>
           </p:cNvPicPr>
-          <p:nvPr>
-            <p:ph sz="quarter" idx="1"/>
-          </p:nvPr>
+          <p:nvPr/>
         </p:nvPicPr>
-        <p:blipFill rotWithShape="1">
+        <p:blipFill>
           <a:blip r:embed="rId2"/>
-          <a:srcRect l="32786" t="24637" r="32370" b="13704"/>
-          <a:stretch/>
+          <a:stretch>
+            <a:fillRect/>
+          </a:stretch>
         </p:blipFill>
         <p:spPr>
           <a:xfrm>
-            <a:off x="2618737" y="1154430"/>
-            <a:ext cx="3928848" cy="3910741"/>
+            <a:off x="3096883" y="1200150"/>
+            <a:ext cx="3816602" cy="3725296"/>
           </a:xfrm>
           <a:prstGeom prst="rect">
             <a:avLst/>
@@ -15747,37 +15746,6 @@
           </a:p>
         </p:txBody>
       </p:sp>
-      <p:pic>
-        <p:nvPicPr>
-          <p:cNvPr id="7" name="Content Placeholder 6">
-            <a:extLst>
-              <a:ext uri="{FF2B5EF4-FFF2-40B4-BE49-F238E27FC236}">
-                <a16:creationId xmlns:a16="http://schemas.microsoft.com/office/drawing/2014/main" id="{FF05E6A3-480C-44B7-992E-A6B68E08844E}"/>
-              </a:ext>
-            </a:extLst>
-          </p:cNvPr>
-          <p:cNvPicPr>
-            <a:picLocks noGrp="1" noChangeAspect="1"/>
-          </p:cNvPicPr>
-          <p:nvPr>
-            <p:ph sz="quarter" idx="1"/>
-          </p:nvPr>
-        </p:nvPicPr>
-        <p:blipFill rotWithShape="1">
-          <a:blip r:embed="rId2"/>
-          <a:srcRect l="57747" t="24670" r="7122" b="10957"/>
-          <a:stretch/>
-        </p:blipFill>
-        <p:spPr>
-          <a:xfrm>
-            <a:off x="2636982" y="1154648"/>
-            <a:ext cx="3870036" cy="3988852"/>
-          </a:xfrm>
-          <a:prstGeom prst="rect">
-            <a:avLst/>
-          </a:prstGeom>
-        </p:spPr>
-      </p:pic>
       <p:sp>
         <p:nvSpPr>
           <p:cNvPr id="6" name="TextBox 5">
@@ -15813,6 +15781,36 @@
           </a:p>
         </p:txBody>
       </p:sp>
+      <p:pic>
+        <p:nvPicPr>
+          <p:cNvPr id="5" name="Picture 4">
+            <a:extLst>
+              <a:ext uri="{FF2B5EF4-FFF2-40B4-BE49-F238E27FC236}">
+                <a16:creationId xmlns:a16="http://schemas.microsoft.com/office/drawing/2014/main" id="{8AD52BA5-8F36-427B-BFFB-65F51087882A}"/>
+              </a:ext>
+            </a:extLst>
+          </p:cNvPr>
+          <p:cNvPicPr>
+            <a:picLocks noChangeAspect="1"/>
+          </p:cNvPicPr>
+          <p:nvPr/>
+        </p:nvPicPr>
+        <p:blipFill>
+          <a:blip r:embed="rId2"/>
+          <a:stretch>
+            <a:fillRect/>
+          </a:stretch>
+        </p:blipFill>
+        <p:spPr>
+          <a:xfrm>
+            <a:off x="2710523" y="1197714"/>
+            <a:ext cx="3722953" cy="3859521"/>
+          </a:xfrm>
+          <a:prstGeom prst="rect">
+            <a:avLst/>
+          </a:prstGeom>
+        </p:spPr>
+      </p:pic>
     </p:spTree>
     <p:extLst>
       <p:ext uri="{BB962C8B-B14F-4D97-AF65-F5344CB8AC3E}">
@@ -29546,7 +29544,7 @@
             <p:ph sz="quarter" idx="1"/>
             <p:extLst>
               <p:ext uri="{D42A27DB-BD31-4B8C-83A1-F6EECF244321}">
-                <p14:modId xmlns:p14="http://schemas.microsoft.com/office/powerpoint/2010/main" val="1580801003"/>
+                <p14:modId xmlns:p14="http://schemas.microsoft.com/office/powerpoint/2010/main" val="3152276285"/>
               </p:ext>
             </p:extLst>
           </p:nvPr>
@@ -29627,7 +29625,53 @@
                 </a:gridCol>
               </a:tblGrid>
               <a:tr h="248432">
-                <a:tc rowSpan="2">
+                <a:tc rowSpan="2" gridSpan="2">
+                  <a:txBody>
+                    <a:bodyPr/>
+                    <a:lstStyle/>
+                    <a:p>
+                      <a:pPr algn="ctr" fontAlgn="ctr"/>
+                      <a:r>
+                        <a:rPr lang="en-US" sz="1600" b="0" i="0" u="none" strike="noStrike" dirty="0">
+                          <a:solidFill>
+                            <a:schemeClr val="bg1"/>
+                          </a:solidFill>
+                          <a:effectLst/>
+                          <a:latin typeface="Calibri"/>
+                        </a:rPr>
+                        <a:t>Estimation Accuracy: -114%</a:t>
+                      </a:r>
+                      <a:endParaRPr lang="sk-SK" sz="1600" b="0" i="0" u="none" strike="noStrike" dirty="0">
+                        <a:solidFill>
+                          <a:schemeClr val="bg1"/>
+                        </a:solidFill>
+                        <a:effectLst/>
+                        <a:latin typeface="Calibri"/>
+                      </a:endParaRPr>
+                    </a:p>
+                  </a:txBody>
+                  <a:tcPr marL="12226" marR="12226" marT="12700" marB="0" anchor="ctr">
+                    <a:lnR w="9525" cap="flat" cmpd="sng" algn="ctr">
+                      <a:solidFill>
+                        <a:srgbClr val="968C8C"/>
+                      </a:solidFill>
+                      <a:prstDash val="solid"/>
+                      <a:round/>
+                      <a:headEnd type="none" w="med" len="med"/>
+                      <a:tailEnd type="none" w="med" len="med"/>
+                    </a:lnR>
+                    <a:lnT w="38100" cap="flat" cmpd="sng" algn="ctr">
+                      <a:solidFill>
+                        <a:srgbClr val="000000"/>
+                      </a:solidFill>
+                      <a:prstDash val="solid"/>
+                      <a:round/>
+                      <a:headEnd type="none" w="med" len="med"/>
+                      <a:tailEnd type="none" w="med" len="med"/>
+                    </a:lnT>
+                  </a:tcPr>
+                </a:tc>
+                <a:tc rowSpan="2" hMerge="1">
                   <a:txBody>
                     <a:bodyPr/>
                     <a:lstStyle/>
@@ -29643,42 +29687,6 @@
                     </a:p>
                   </a:txBody>
                   <a:tcPr marL="12226" marR="12226" marT="12700" marB="0" anchor="b">
-                    <a:lnR w="9525" cap="flat" cmpd="sng" algn="ctr">
-                      <a:solidFill>
-                        <a:srgbClr val="968C8C"/>
-                      </a:solidFill>
-                      <a:prstDash val="solid"/>
-                      <a:round/>
-                      <a:headEnd type="none" w="med" len="med"/>
-                      <a:tailEnd type="none" w="med" len="med"/>
-                    </a:lnR>
-                    <a:lnT w="38100" cap="flat" cmpd="sng" algn="ctr">
-                      <a:solidFill>
-                        <a:srgbClr val="000000"/>
-                      </a:solidFill>
-                      <a:prstDash val="solid"/>
-                      <a:round/>
-                      <a:headEnd type="none" w="med" len="med"/>
-                      <a:tailEnd type="none" w="med" len="med"/>
-                    </a:lnT>
-                  </a:tcPr>
-                </a:tc>
-                <a:tc rowSpan="2">
-                  <a:txBody>
-                    <a:bodyPr/>
-                    <a:lstStyle/>
-                    <a:p>
-                      <a:pPr algn="ctr" fontAlgn="ctr"/>
-                      <a:endParaRPr lang="sk-SK" sz="2000" b="0" i="0" u="none" strike="noStrike" dirty="0">
-                        <a:solidFill>
-                          <a:srgbClr val="000000"/>
-                        </a:solidFill>
-                        <a:effectLst/>
-                        <a:latin typeface="Calibri"/>
-                      </a:endParaRPr>
-                    </a:p>
-                  </a:txBody>
-                  <a:tcPr marL="12226" marR="12226" marT="12700" marB="0" anchor="b">
                     <a:lnL w="9525" cap="flat" cmpd="sng" algn="ctr">
                       <a:solidFill>
                         <a:srgbClr val="968C8C"/>
@@ -30047,7 +30055,7 @@
                 </a:extLst>
               </a:tr>
               <a:tr h="406368">
-                <a:tc vMerge="1">
+                <a:tc gridSpan="2" vMerge="1">
                   <a:txBody>
                     <a:bodyPr/>
                     <a:lstStyle/>
@@ -30057,7 +30065,7 @@
                   </a:txBody>
                   <a:tcPr/>
                 </a:tc>
-                <a:tc vMerge="1">
+                <a:tc hMerge="1" vMerge="1">
                   <a:txBody>
                     <a:bodyPr/>
                     <a:lstStyle/>
@@ -33622,12 +33630,12 @@
                     <a:p>
                       <a:pPr algn="l" fontAlgn="ctr"/>
                       <a:r>
-                        <a:rPr lang="en-US" sz="1200" u="none" strike="noStrike">
+                        <a:rPr lang="en-US" sz="1200" u="none" strike="noStrike" dirty="0">
                           <a:effectLst/>
                         </a:rPr>
                         <a:t>Issues from peer reviews attained</a:t>
                       </a:r>
-                      <a:endParaRPr lang="en-US" sz="1200" b="0" i="0" u="none" strike="noStrike">
+                      <a:endParaRPr lang="en-US" sz="1200" b="0" i="0" u="none" strike="noStrike" dirty="0">
                         <a:solidFill>
                           <a:srgbClr val="000000"/>
                         </a:solidFill>
@@ -33998,7 +34006,7 @@
                         <a:rPr lang="en-US" sz="1200" u="none" strike="noStrike" dirty="0" err="1">
                           <a:effectLst/>
                         </a:rPr>
-                        <a:t>FitFOrMe</a:t>
+                        <a:t>FitForMe</a:t>
                       </a:r>
                       <a:endParaRPr lang="en-US" sz="1200" b="0" i="0" u="none" strike="noStrike" dirty="0">
                         <a:solidFill>

</xml_diff>